<commit_message>
added MBA for peoTV dataset
</commit_message>
<xml_diff>
--- a/documents/presentations/SLT project - Data Engineering Flow.pptx
+++ b/documents/presentations/SLT project - Data Engineering Flow.pptx
@@ -63,23 +63,24 @@
     <p:sldId id="308" r:id="rId58"/>
     <p:sldId id="309" r:id="rId59"/>
     <p:sldId id="310" r:id="rId60"/>
+    <p:sldId id="311" r:id="rId61"/>
   </p:sldIdLst>
   <p:sldSz cy="5143500" cx="9144000"/>
   <p:notesSz cx="6858000" cy="9144000"/>
   <p:embeddedFontLst>
     <p:embeddedFont>
       <p:font typeface="Raleway"/>
-      <p:regular r:id="rId61"/>
-      <p:bold r:id="rId62"/>
-      <p:italic r:id="rId63"/>
-      <p:boldItalic r:id="rId64"/>
+      <p:regular r:id="rId62"/>
+      <p:bold r:id="rId63"/>
+      <p:italic r:id="rId64"/>
+      <p:boldItalic r:id="rId65"/>
     </p:embeddedFont>
     <p:embeddedFont>
       <p:font typeface="Lato"/>
-      <p:regular r:id="rId65"/>
-      <p:bold r:id="rId66"/>
-      <p:italic r:id="rId67"/>
-      <p:boldItalic r:id="rId68"/>
+      <p:regular r:id="rId66"/>
+      <p:bold r:id="rId67"/>
+      <p:italic r:id="rId68"/>
+      <p:boldItalic r:id="rId69"/>
     </p:embeddedFont>
   </p:embeddedFontLst>
   <p:defaultTextStyle>
@@ -4735,7 +4736,7 @@
       </p:grpSpPr>
       <p:sp>
         <p:nvSpPr>
-          <p:cNvPr id="425" name="Google Shape;425;gdb0bea56ff_0_2:notes"/>
+          <p:cNvPr id="425" name="Google Shape;425;gde5c3e8165_0_0:notes"/>
           <p:cNvSpPr/>
           <p:nvPr>
             <p:ph idx="2" type="sldImg"/>
@@ -4770,7 +4771,7 @@
       </p:sp>
       <p:sp>
         <p:nvSpPr>
-          <p:cNvPr id="426" name="Google Shape;426;gdb0bea56ff_0_2:notes"/>
+          <p:cNvPr id="426" name="Google Shape;426;gde5c3e8165_0_0:notes"/>
           <p:cNvSpPr txBox="1"/>
           <p:nvPr>
             <p:ph idx="1" type="body"/>
@@ -4834,7 +4835,7 @@
       </p:grpSpPr>
       <p:sp>
         <p:nvSpPr>
-          <p:cNvPr id="431" name="Google Shape;431;gdb0bea56ff_0_21:notes"/>
+          <p:cNvPr id="431" name="Google Shape;431;gdb0bea56ff_0_2:notes"/>
           <p:cNvSpPr/>
           <p:nvPr>
             <p:ph idx="2" type="sldImg"/>
@@ -4869,7 +4870,7 @@
       </p:sp>
       <p:sp>
         <p:nvSpPr>
-          <p:cNvPr id="432" name="Google Shape;432;gdb0bea56ff_0_21:notes"/>
+          <p:cNvPr id="432" name="Google Shape;432;gdb0bea56ff_0_2:notes"/>
           <p:cNvSpPr txBox="1"/>
           <p:nvPr>
             <p:ph idx="1" type="body"/>
@@ -4919,7 +4920,7 @@
   <p:cSld>
     <p:spTree>
       <p:nvGrpSpPr>
-        <p:cNvPr id="440" name="Shape 440"/>
+        <p:cNvPr id="436" name="Shape 436"/>
         <p:cNvGrpSpPr/>
         <p:nvPr/>
       </p:nvGrpSpPr>
@@ -4933,7 +4934,7 @@
       </p:grpSpPr>
       <p:sp>
         <p:nvSpPr>
-          <p:cNvPr id="441" name="Google Shape;441;gdb0bea56ff_0_14:notes"/>
+          <p:cNvPr id="437" name="Google Shape;437;gdb0bea56ff_0_21:notes"/>
           <p:cNvSpPr/>
           <p:nvPr>
             <p:ph idx="2" type="sldImg"/>
@@ -4968,7 +4969,7 @@
       </p:sp>
       <p:sp>
         <p:nvSpPr>
-          <p:cNvPr id="442" name="Google Shape;442;gdb0bea56ff_0_14:notes"/>
+          <p:cNvPr id="438" name="Google Shape;438;gdb0bea56ff_0_21:notes"/>
           <p:cNvSpPr txBox="1"/>
           <p:nvPr>
             <p:ph idx="1" type="body"/>
@@ -5018,7 +5019,7 @@
   <p:cSld>
     <p:spTree>
       <p:nvGrpSpPr>
-        <p:cNvPr id="447" name="Shape 447"/>
+        <p:cNvPr id="446" name="Shape 446"/>
         <p:cNvGrpSpPr/>
         <p:nvPr/>
       </p:nvGrpSpPr>
@@ -5032,7 +5033,7 @@
       </p:grpSpPr>
       <p:sp>
         <p:nvSpPr>
-          <p:cNvPr id="448" name="Google Shape;448;gdd34e4ffd5_0_423:notes"/>
+          <p:cNvPr id="447" name="Google Shape;447;gdb0bea56ff_0_14:notes"/>
           <p:cNvSpPr/>
           <p:nvPr>
             <p:ph idx="2" type="sldImg"/>
@@ -5067,7 +5068,7 @@
       </p:sp>
       <p:sp>
         <p:nvSpPr>
-          <p:cNvPr id="449" name="Google Shape;449;gdd34e4ffd5_0_423:notes"/>
+          <p:cNvPr id="448" name="Google Shape;448;gdb0bea56ff_0_14:notes"/>
           <p:cNvSpPr txBox="1"/>
           <p:nvPr>
             <p:ph idx="1" type="body"/>
@@ -5216,7 +5217,7 @@
   <p:cSld>
     <p:spTree>
       <p:nvGrpSpPr>
-        <p:cNvPr id="454" name="Shape 454"/>
+        <p:cNvPr id="453" name="Shape 453"/>
         <p:cNvGrpSpPr/>
         <p:nvPr/>
       </p:nvGrpSpPr>
@@ -5230,7 +5231,7 @@
       </p:grpSpPr>
       <p:sp>
         <p:nvSpPr>
-          <p:cNvPr id="455" name="Google Shape;455;gdd34e4ffd5_0_429:notes"/>
+          <p:cNvPr id="454" name="Google Shape;454;gdd34e4ffd5_0_423:notes"/>
           <p:cNvSpPr/>
           <p:nvPr>
             <p:ph idx="2" type="sldImg"/>
@@ -5265,7 +5266,7 @@
       </p:sp>
       <p:sp>
         <p:nvSpPr>
-          <p:cNvPr id="456" name="Google Shape;456;gdd34e4ffd5_0_429:notes"/>
+          <p:cNvPr id="455" name="Google Shape;455;gdd34e4ffd5_0_423:notes"/>
           <p:cNvSpPr txBox="1"/>
           <p:nvPr>
             <p:ph idx="1" type="body"/>
@@ -5315,7 +5316,7 @@
   <p:cSld>
     <p:spTree>
       <p:nvGrpSpPr>
-        <p:cNvPr id="461" name="Shape 461"/>
+        <p:cNvPr id="460" name="Shape 460"/>
         <p:cNvGrpSpPr/>
         <p:nvPr/>
       </p:nvGrpSpPr>
@@ -5329,7 +5330,7 @@
       </p:grpSpPr>
       <p:sp>
         <p:nvSpPr>
-          <p:cNvPr id="462" name="Google Shape;462;gdd34e4ffd5_0_434:notes"/>
+          <p:cNvPr id="461" name="Google Shape;461;gdd34e4ffd5_0_429:notes"/>
           <p:cNvSpPr/>
           <p:nvPr>
             <p:ph idx="2" type="sldImg"/>
@@ -5364,7 +5365,7 @@
       </p:sp>
       <p:sp>
         <p:nvSpPr>
-          <p:cNvPr id="463" name="Google Shape;463;gdd34e4ffd5_0_434:notes"/>
+          <p:cNvPr id="462" name="Google Shape;462;gdd34e4ffd5_0_429:notes"/>
           <p:cNvSpPr txBox="1"/>
           <p:nvPr>
             <p:ph idx="1" type="body"/>
@@ -5428,7 +5429,7 @@
       </p:grpSpPr>
       <p:sp>
         <p:nvSpPr>
-          <p:cNvPr id="468" name="Google Shape;468;gdd34e4ffd5_0_451:notes"/>
+          <p:cNvPr id="468" name="Google Shape;468;gdd34e4ffd5_0_434:notes"/>
           <p:cNvSpPr/>
           <p:nvPr>
             <p:ph idx="2" type="sldImg"/>
@@ -5463,7 +5464,7 @@
       </p:sp>
       <p:sp>
         <p:nvSpPr>
-          <p:cNvPr id="469" name="Google Shape;469;gdd34e4ffd5_0_451:notes"/>
+          <p:cNvPr id="469" name="Google Shape;469;gdd34e4ffd5_0_434:notes"/>
           <p:cNvSpPr txBox="1"/>
           <p:nvPr>
             <p:ph idx="1" type="body"/>
@@ -5513,7 +5514,7 @@
   <p:cSld>
     <p:spTree>
       <p:nvGrpSpPr>
-        <p:cNvPr id="474" name="Shape 474"/>
+        <p:cNvPr id="473" name="Shape 473"/>
         <p:cNvGrpSpPr/>
         <p:nvPr/>
       </p:nvGrpSpPr>
@@ -5527,7 +5528,7 @@
       </p:grpSpPr>
       <p:sp>
         <p:nvSpPr>
-          <p:cNvPr id="475" name="Google Shape;475;gdd34e4ffd5_0_462:notes"/>
+          <p:cNvPr id="474" name="Google Shape;474;gdd34e4ffd5_0_451:notes"/>
           <p:cNvSpPr/>
           <p:nvPr>
             <p:ph idx="2" type="sldImg"/>
@@ -5562,7 +5563,7 @@
       </p:sp>
       <p:sp>
         <p:nvSpPr>
-          <p:cNvPr id="476" name="Google Shape;476;gdd34e4ffd5_0_462:notes"/>
+          <p:cNvPr id="475" name="Google Shape;475;gdd34e4ffd5_0_451:notes"/>
           <p:cNvSpPr txBox="1"/>
           <p:nvPr>
             <p:ph idx="1" type="body"/>
@@ -5626,7 +5627,7 @@
       </p:grpSpPr>
       <p:sp>
         <p:nvSpPr>
-          <p:cNvPr id="481" name="Google Shape;481;gda272428dd_0_1107:notes"/>
+          <p:cNvPr id="481" name="Google Shape;481;gdd34e4ffd5_0_462:notes"/>
           <p:cNvSpPr/>
           <p:nvPr>
             <p:ph idx="2" type="sldImg"/>
@@ -5661,7 +5662,7 @@
       </p:sp>
       <p:sp>
         <p:nvSpPr>
-          <p:cNvPr id="482" name="Google Shape;482;gda272428dd_0_1107:notes"/>
+          <p:cNvPr id="482" name="Google Shape;482;gdd34e4ffd5_0_462:notes"/>
           <p:cNvSpPr txBox="1"/>
           <p:nvPr>
             <p:ph idx="1" type="body"/>
@@ -5711,7 +5712,7 @@
   <p:cSld>
     <p:spTree>
       <p:nvGrpSpPr>
-        <p:cNvPr id="488" name="Shape 488"/>
+        <p:cNvPr id="486" name="Shape 486"/>
         <p:cNvGrpSpPr/>
         <p:nvPr/>
       </p:nvGrpSpPr>
@@ -5725,7 +5726,7 @@
       </p:grpSpPr>
       <p:sp>
         <p:nvSpPr>
-          <p:cNvPr id="489" name="Google Shape;489;gda272428dd_0_1115:notes"/>
+          <p:cNvPr id="487" name="Google Shape;487;gda272428dd_0_1107:notes"/>
           <p:cNvSpPr/>
           <p:nvPr>
             <p:ph idx="2" type="sldImg"/>
@@ -5760,7 +5761,106 @@
       </p:sp>
       <p:sp>
         <p:nvSpPr>
-          <p:cNvPr id="490" name="Google Shape;490;gda272428dd_0_1115:notes"/>
+          <p:cNvPr id="488" name="Google Shape;488;gda272428dd_0_1107:notes"/>
+          <p:cNvSpPr txBox="1"/>
+          <p:nvPr>
+            <p:ph idx="1" type="body"/>
+          </p:nvPr>
+        </p:nvSpPr>
+        <p:spPr>
+          <a:xfrm>
+            <a:off x="685800" y="4343400"/>
+            <a:ext cx="5486400" cy="4114800"/>
+          </a:xfrm>
+          <a:prstGeom prst="rect">
+            <a:avLst/>
+          </a:prstGeom>
+        </p:spPr>
+        <p:txBody>
+          <a:bodyPr anchorCtr="0" anchor="t" bIns="91425" lIns="91425" spcFirstLastPara="1" rIns="91425" wrap="square" tIns="91425">
+            <a:noAutofit/>
+          </a:bodyPr>
+          <a:lstStyle/>
+          <a:p>
+            <a:pPr indent="0" lvl="0" marL="0" rtl="0" algn="l">
+              <a:spcBef>
+                <a:spcPts val="0"/>
+              </a:spcBef>
+              <a:spcAft>
+                <a:spcPts val="0"/>
+              </a:spcAft>
+              <a:buNone/>
+            </a:pPr>
+            <a:r>
+              <a:t/>
+            </a:r>
+            <a:endParaRPr/>
+          </a:p>
+        </p:txBody>
+      </p:sp>
+    </p:spTree>
+  </p:cSld>
+  <p:clrMapOvr>
+    <a:masterClrMapping/>
+  </p:clrMapOvr>
+</p:notes>
+</file>
+
+<file path=ppt/notesSlides/notesSlide56.xml><?xml version="1.0" encoding="utf-8"?>
+<p:notes xmlns:a="http://schemas.openxmlformats.org/drawingml/2006/main" xmlns:r="http://schemas.openxmlformats.org/officeDocument/2006/relationships" xmlns:mc="http://schemas.openxmlformats.org/markup-compatibility/2006" xmlns:mv="urn:schemas-microsoft-com:mac:vml" xmlns:p="http://schemas.openxmlformats.org/presentationml/2006/main" xmlns:c="http://schemas.openxmlformats.org/drawingml/2006/chart" xmlns:dgm="http://schemas.openxmlformats.org/drawingml/2006/diagram" xmlns:o="urn:schemas-microsoft-com:office:office" xmlns:v="urn:schemas-microsoft-com:vml" xmlns:pvml="urn:schemas-microsoft-com:office:powerpoint" xmlns:com="http://schemas.openxmlformats.org/drawingml/2006/compatibility" xmlns:p14="http://schemas.microsoft.com/office/powerpoint/2010/main" xmlns:p15="http://schemas.microsoft.com/office/powerpoint/2012/main" xmlns:ahyp="http://schemas.microsoft.com/office/drawing/2018/hyperlinkcolor" showMasterPhAnim="0" showMasterSp="0">
+  <p:cSld>
+    <p:spTree>
+      <p:nvGrpSpPr>
+        <p:cNvPr id="494" name="Shape 494"/>
+        <p:cNvGrpSpPr/>
+        <p:nvPr/>
+      </p:nvGrpSpPr>
+      <p:grpSpPr>
+        <a:xfrm>
+          <a:off x="0" y="0"/>
+          <a:ext cx="0" cy="0"/>
+          <a:chOff x="0" y="0"/>
+          <a:chExt cx="0" cy="0"/>
+        </a:xfrm>
+      </p:grpSpPr>
+      <p:sp>
+        <p:nvSpPr>
+          <p:cNvPr id="495" name="Google Shape;495;gda272428dd_0_1115:notes"/>
+          <p:cNvSpPr/>
+          <p:nvPr>
+            <p:ph idx="2" type="sldImg"/>
+          </p:nvPr>
+        </p:nvSpPr>
+        <p:spPr>
+          <a:xfrm>
+            <a:off x="381300" y="685800"/>
+            <a:ext cx="6096000" cy="3429000"/>
+          </a:xfrm>
+          <a:custGeom>
+            <a:rect b="b" l="l" r="r" t="t"/>
+            <a:pathLst>
+              <a:path extrusionOk="0" h="120000" w="120000">
+                <a:moveTo>
+                  <a:pt x="0" y="0"/>
+                </a:moveTo>
+                <a:lnTo>
+                  <a:pt x="120000" y="0"/>
+                </a:lnTo>
+                <a:lnTo>
+                  <a:pt x="120000" y="120000"/>
+                </a:lnTo>
+                <a:lnTo>
+                  <a:pt x="0" y="120000"/>
+                </a:lnTo>
+                <a:close/>
+              </a:path>
+            </a:pathLst>
+          </a:custGeom>
+        </p:spPr>
+      </p:sp>
+      <p:sp>
+        <p:nvSpPr>
+          <p:cNvPr id="496" name="Google Shape;496;gda272428dd_0_1115:notes"/>
           <p:cNvSpPr txBox="1"/>
           <p:nvPr>
             <p:ph idx="1" type="body"/>
@@ -16659,7 +16759,15 @@
                   <a:srgbClr val="434343"/>
                 </a:solidFill>
               </a:rPr>
-              <a:t>Bin ranges selected considering skewness of data distribution</a:t>
+              <a:t>Bin ranges selected considering skewness of data distribution </a:t>
+            </a:r>
+            <a:r>
+              <a:rPr lang="en">
+                <a:solidFill>
+                  <a:srgbClr val="434343"/>
+                </a:solidFill>
+              </a:rPr>
+              <a:t>(25,50,75th precentiles)</a:t>
             </a:r>
             <a:endParaRPr>
               <a:solidFill>
@@ -16775,7 +16883,15 @@
                   <a:srgbClr val="434343"/>
                 </a:solidFill>
               </a:rPr>
-              <a:t>Bin ranges selected considering skewness of data distribution</a:t>
+              <a:t>Bin ranges selected considering skewness of data distribution </a:t>
+            </a:r>
+            <a:r>
+              <a:rPr lang="en">
+                <a:solidFill>
+                  <a:srgbClr val="434343"/>
+                </a:solidFill>
+              </a:rPr>
+              <a:t>(25,50,75th precentiles)</a:t>
             </a:r>
             <a:endParaRPr>
               <a:solidFill>
@@ -20616,38 +20732,22 @@
                   <a:srgbClr val="434343"/>
                 </a:solidFill>
               </a:rPr>
-              <a:t>Bin ranges selected considering skewness of data distribution</a:t>
-            </a:r>
-            <a:endParaRPr>
-              <a:solidFill>
-                <a:srgbClr val="434343"/>
-              </a:solidFill>
-            </a:endParaRPr>
-          </a:p>
-          <a:p>
-            <a:pPr indent="-298450" lvl="1" marL="914400" rtl="0" algn="l">
-              <a:lnSpc>
-                <a:spcPct val="200000"/>
-              </a:lnSpc>
-              <a:spcBef>
-                <a:spcPts val="0"/>
-              </a:spcBef>
-              <a:spcAft>
-                <a:spcPts val="0"/>
-              </a:spcAft>
-              <a:buClr>
-                <a:srgbClr val="434343"/>
-              </a:buClr>
-              <a:buSzPts val="1100"/>
-              <a:buChar char="○"/>
-            </a:pPr>
-            <a:r>
-              <a:rPr b="1" lang="en">
-                <a:solidFill>
-                  <a:srgbClr val="434343"/>
-                </a:solidFill>
-              </a:rPr>
-              <a:t>Freedman-Diaconis’s Rule based approach (Using Interquartile range)</a:t>
+              <a:t>Bin ranges selected considering skewness of data distribution </a:t>
+            </a:r>
+            <a:br>
+              <a:rPr lang="en">
+                <a:solidFill>
+                  <a:srgbClr val="434343"/>
+                </a:solidFill>
+              </a:rPr>
+            </a:br>
+            <a:r>
+              <a:rPr lang="en">
+                <a:solidFill>
+                  <a:srgbClr val="434343"/>
+                </a:solidFill>
+              </a:rPr>
+              <a:t>(25,50,75th precentiles)</a:t>
             </a:r>
             <a:endParaRPr>
               <a:solidFill>
@@ -26289,7 +26389,7 @@
             </a:pPr>
             <a:r>
               <a:rPr lang="en"/>
-              <a:t>User Profile : Clustering Users</a:t>
+              <a:t>User Profile cont’d.</a:t>
             </a:r>
             <a:endParaRPr/>
           </a:p>
@@ -26340,7 +26440,7 @@
                   <a:srgbClr val="434343"/>
                 </a:solidFill>
               </a:rPr>
-              <a:t>K-Means Clustering based on Scaled user features (Usage Ratings)</a:t>
+              <a:t>Customers with products from all categories (PeoTV, VOICE and Other)</a:t>
             </a:r>
             <a:endParaRPr>
               <a:solidFill>
@@ -26366,12 +26466,66 @@
               <a:buChar char="○"/>
             </a:pPr>
             <a:r>
+              <a:rPr b="1" lang="en">
+                <a:solidFill>
+                  <a:srgbClr val="434343"/>
+                </a:solidFill>
+              </a:rPr>
+              <a:t>40</a:t>
+            </a:r>
+            <a:r>
               <a:rPr lang="en">
                 <a:solidFill>
                   <a:srgbClr val="434343"/>
                 </a:solidFill>
               </a:rPr>
-              <a:t>Best no of clusters (k) was selected using Elbow method</a:t>
+              <a:t> / 3307    </a:t>
+            </a:r>
+            <a:r>
+              <a:rPr b="1" lang="en">
+                <a:solidFill>
+                  <a:srgbClr val="434343"/>
+                </a:solidFill>
+              </a:rPr>
+              <a:t>(1.2%)</a:t>
+            </a:r>
+            <a:br>
+              <a:rPr lang="en">
+                <a:solidFill>
+                  <a:srgbClr val="434343"/>
+                </a:solidFill>
+              </a:rPr>
+            </a:br>
+            <a:endParaRPr sz="700">
+              <a:solidFill>
+                <a:srgbClr val="434343"/>
+              </a:solidFill>
+            </a:endParaRPr>
+          </a:p>
+          <a:p>
+            <a:pPr indent="-311150" lvl="0" marL="457200" rtl="0" algn="l">
+              <a:lnSpc>
+                <a:spcPct val="150000"/>
+              </a:lnSpc>
+              <a:spcBef>
+                <a:spcPts val="0"/>
+              </a:spcBef>
+              <a:spcAft>
+                <a:spcPts val="0"/>
+              </a:spcAft>
+              <a:buClr>
+                <a:srgbClr val="434343"/>
+              </a:buClr>
+              <a:buSzPts val="1300"/>
+              <a:buChar char="●"/>
+            </a:pPr>
+            <a:r>
+              <a:rPr lang="en">
+                <a:solidFill>
+                  <a:srgbClr val="434343"/>
+                </a:solidFill>
+              </a:rPr>
+              <a:t>Customers who has purchased Voice Packages and VAS</a:t>
             </a:r>
             <a:endParaRPr>
               <a:solidFill>
@@ -26397,105 +26551,28 @@
               <a:buChar char="○"/>
             </a:pPr>
             <a:r>
+              <a:rPr b="1" lang="en">
+                <a:solidFill>
+                  <a:srgbClr val="434343"/>
+                </a:solidFill>
+              </a:rPr>
+              <a:t>300</a:t>
+            </a:r>
+            <a:r>
               <a:rPr lang="en">
                 <a:solidFill>
                   <a:srgbClr val="434343"/>
                 </a:solidFill>
               </a:rPr>
-              <a:t>Three clusters were identified </a:t>
-            </a:r>
-            <a:endParaRPr>
-              <a:solidFill>
-                <a:srgbClr val="434343"/>
-              </a:solidFill>
-            </a:endParaRPr>
-          </a:p>
-          <a:p>
-            <a:pPr indent="-298450" lvl="2" marL="1371600" rtl="0" algn="l">
-              <a:lnSpc>
-                <a:spcPct val="150000"/>
-              </a:lnSpc>
-              <a:spcBef>
-                <a:spcPts val="0"/>
-              </a:spcBef>
-              <a:spcAft>
-                <a:spcPts val="0"/>
-              </a:spcAft>
-              <a:buClr>
-                <a:srgbClr val="434343"/>
-              </a:buClr>
-              <a:buSzPts val="1100"/>
-              <a:buChar char="■"/>
-            </a:pPr>
-            <a:r>
-              <a:rPr lang="en">
-                <a:solidFill>
-                  <a:srgbClr val="434343"/>
-                </a:solidFill>
-              </a:rPr>
-              <a:t>Cluster 1: 914 users, </a:t>
-            </a:r>
-            <a:endParaRPr>
-              <a:solidFill>
-                <a:srgbClr val="434343"/>
-              </a:solidFill>
-            </a:endParaRPr>
-          </a:p>
-          <a:p>
-            <a:pPr indent="-298450" lvl="2" marL="1371600" rtl="0" algn="l">
-              <a:lnSpc>
-                <a:spcPct val="150000"/>
-              </a:lnSpc>
-              <a:spcBef>
-                <a:spcPts val="0"/>
-              </a:spcBef>
-              <a:spcAft>
-                <a:spcPts val="0"/>
-              </a:spcAft>
-              <a:buClr>
-                <a:srgbClr val="434343"/>
-              </a:buClr>
-              <a:buSzPts val="1100"/>
-              <a:buChar char="■"/>
-            </a:pPr>
-            <a:r>
-              <a:rPr lang="en">
-                <a:solidFill>
-                  <a:srgbClr val="434343"/>
-                </a:solidFill>
-              </a:rPr>
-              <a:t>Cluster 2: 2145 users, </a:t>
-            </a:r>
-            <a:endParaRPr>
-              <a:solidFill>
-                <a:srgbClr val="434343"/>
-              </a:solidFill>
-            </a:endParaRPr>
-          </a:p>
-          <a:p>
-            <a:pPr indent="-298450" lvl="2" marL="1371600" rtl="0" algn="l">
-              <a:lnSpc>
-                <a:spcPct val="150000"/>
-              </a:lnSpc>
-              <a:spcBef>
-                <a:spcPts val="0"/>
-              </a:spcBef>
-              <a:spcAft>
-                <a:spcPts val="0"/>
-              </a:spcAft>
-              <a:buClr>
-                <a:srgbClr val="434343"/>
-              </a:buClr>
-              <a:buSzPts val="1100"/>
-              <a:buChar char="■"/>
-            </a:pPr>
-            <a:r>
-              <a:rPr lang="en">
-                <a:solidFill>
-                  <a:srgbClr val="434343"/>
-                </a:solidFill>
-              </a:rPr>
-              <a:t>Cluster 3: 248 users</a:t>
+              <a:t> / 3307  </a:t>
+            </a:r>
+            <a:r>
+              <a:rPr b="1" lang="en">
+                <a:solidFill>
+                  <a:srgbClr val="434343"/>
+                </a:solidFill>
+              </a:rPr>
+              <a:t>(9.07%)</a:t>
             </a:r>
             <a:br>
               <a:rPr lang="en">
@@ -26504,7 +26581,7 @@
                 </a:solidFill>
               </a:rPr>
             </a:br>
-            <a:endParaRPr>
+            <a:endParaRPr sz="700">
               <a:solidFill>
                 <a:srgbClr val="434343"/>
               </a:solidFill>
@@ -26533,15 +26610,7 @@
                   <a:srgbClr val="434343"/>
                 </a:solidFill>
               </a:rPr>
-              <a:t>Hierarchical (Agglomerative)</a:t>
-            </a:r>
-            <a:r>
-              <a:rPr lang="en">
-                <a:solidFill>
-                  <a:srgbClr val="434343"/>
-                </a:solidFill>
-              </a:rPr>
-              <a:t> Clustering based on Scaled user features (Usage Ratings)</a:t>
+              <a:t>Customers who has purchased PeoTV Packages</a:t>
             </a:r>
             <a:endParaRPr>
               <a:solidFill>
@@ -26567,12 +26636,66 @@
               <a:buChar char="○"/>
             </a:pPr>
             <a:r>
+              <a:rPr b="1" lang="en">
+                <a:solidFill>
+                  <a:srgbClr val="434343"/>
+                </a:solidFill>
+              </a:rPr>
+              <a:t>1274</a:t>
+            </a:r>
+            <a:r>
               <a:rPr lang="en">
                 <a:solidFill>
                   <a:srgbClr val="434343"/>
                 </a:solidFill>
               </a:rPr>
-              <a:t>Best no of clusters were identified as 3.</a:t>
+              <a:t> / 3307   </a:t>
+            </a:r>
+            <a:r>
+              <a:rPr b="1" lang="en">
+                <a:solidFill>
+                  <a:srgbClr val="434343"/>
+                </a:solidFill>
+              </a:rPr>
+              <a:t>(38.52%)</a:t>
+            </a:r>
+            <a:br>
+              <a:rPr lang="en">
+                <a:solidFill>
+                  <a:srgbClr val="434343"/>
+                </a:solidFill>
+              </a:rPr>
+            </a:br>
+            <a:endParaRPr sz="700">
+              <a:solidFill>
+                <a:srgbClr val="434343"/>
+              </a:solidFill>
+            </a:endParaRPr>
+          </a:p>
+          <a:p>
+            <a:pPr indent="-311150" lvl="0" marL="457200" rtl="0" algn="l">
+              <a:lnSpc>
+                <a:spcPct val="150000"/>
+              </a:lnSpc>
+              <a:spcBef>
+                <a:spcPts val="0"/>
+              </a:spcBef>
+              <a:spcAft>
+                <a:spcPts val="0"/>
+              </a:spcAft>
+              <a:buClr>
+                <a:srgbClr val="434343"/>
+              </a:buClr>
+              <a:buSzPts val="1300"/>
+              <a:buChar char="●"/>
+            </a:pPr>
+            <a:r>
+              <a:rPr lang="en">
+                <a:solidFill>
+                  <a:srgbClr val="434343"/>
+                </a:solidFill>
+              </a:rPr>
+              <a:t>Customers who has purchased at least one Product or Package</a:t>
             </a:r>
             <a:endParaRPr>
               <a:solidFill>
@@ -26598,14 +26721,30 @@
               <a:buChar char="○"/>
             </a:pPr>
             <a:r>
+              <a:rPr b="1" lang="en">
+                <a:solidFill>
+                  <a:srgbClr val="434343"/>
+                </a:solidFill>
+              </a:rPr>
+              <a:t>1461</a:t>
+            </a:r>
+            <a:r>
               <a:rPr lang="en">
                 <a:solidFill>
                   <a:srgbClr val="434343"/>
                 </a:solidFill>
               </a:rPr>
-              <a:t>Considered euclidean distances</a:t>
-            </a:r>
-            <a:endParaRPr>
+              <a:t> / 3307  </a:t>
+            </a:r>
+            <a:r>
+              <a:rPr b="1" lang="en">
+                <a:solidFill>
+                  <a:srgbClr val="434343"/>
+                </a:solidFill>
+              </a:rPr>
+              <a:t>(44.18%)</a:t>
+            </a:r>
+            <a:endParaRPr b="1">
               <a:solidFill>
                 <a:srgbClr val="434343"/>
               </a:solidFill>
@@ -26682,6 +26821,389 @@
         <p:nvSpPr>
           <p:cNvPr id="435" name="Google Shape;435;p59"/>
           <p:cNvSpPr txBox="1"/>
+          <p:nvPr>
+            <p:ph idx="1" type="body"/>
+          </p:nvPr>
+        </p:nvSpPr>
+        <p:spPr>
+          <a:xfrm>
+            <a:off x="729450" y="1487625"/>
+            <a:ext cx="7792200" cy="3505500"/>
+          </a:xfrm>
+          <a:prstGeom prst="rect">
+            <a:avLst/>
+          </a:prstGeom>
+        </p:spPr>
+        <p:txBody>
+          <a:bodyPr anchorCtr="0" anchor="t" bIns="91425" lIns="91425" spcFirstLastPara="1" rIns="91425" wrap="square" tIns="91425">
+            <a:normAutofit/>
+          </a:bodyPr>
+          <a:lstStyle/>
+          <a:p>
+            <a:pPr indent="-311150" lvl="0" marL="457200" rtl="0" algn="l">
+              <a:lnSpc>
+                <a:spcPct val="150000"/>
+              </a:lnSpc>
+              <a:spcBef>
+                <a:spcPts val="0"/>
+              </a:spcBef>
+              <a:spcAft>
+                <a:spcPts val="0"/>
+              </a:spcAft>
+              <a:buClr>
+                <a:srgbClr val="434343"/>
+              </a:buClr>
+              <a:buSzPts val="1300"/>
+              <a:buChar char="●"/>
+            </a:pPr>
+            <a:r>
+              <a:rPr lang="en">
+                <a:solidFill>
+                  <a:srgbClr val="434343"/>
+                </a:solidFill>
+              </a:rPr>
+              <a:t>K-Means Clustering based on Scaled user features (Usage Ratings)</a:t>
+            </a:r>
+            <a:endParaRPr>
+              <a:solidFill>
+                <a:srgbClr val="434343"/>
+              </a:solidFill>
+            </a:endParaRPr>
+          </a:p>
+          <a:p>
+            <a:pPr indent="-298450" lvl="1" marL="914400" rtl="0" algn="l">
+              <a:lnSpc>
+                <a:spcPct val="150000"/>
+              </a:lnSpc>
+              <a:spcBef>
+                <a:spcPts val="0"/>
+              </a:spcBef>
+              <a:spcAft>
+                <a:spcPts val="0"/>
+              </a:spcAft>
+              <a:buClr>
+                <a:srgbClr val="434343"/>
+              </a:buClr>
+              <a:buSzPts val="1100"/>
+              <a:buChar char="○"/>
+            </a:pPr>
+            <a:r>
+              <a:rPr lang="en">
+                <a:solidFill>
+                  <a:srgbClr val="434343"/>
+                </a:solidFill>
+              </a:rPr>
+              <a:t>Best no of clusters (k) was selected using Elbow method</a:t>
+            </a:r>
+            <a:endParaRPr>
+              <a:solidFill>
+                <a:srgbClr val="434343"/>
+              </a:solidFill>
+            </a:endParaRPr>
+          </a:p>
+          <a:p>
+            <a:pPr indent="-298450" lvl="1" marL="914400" rtl="0" algn="l">
+              <a:lnSpc>
+                <a:spcPct val="150000"/>
+              </a:lnSpc>
+              <a:spcBef>
+                <a:spcPts val="0"/>
+              </a:spcBef>
+              <a:spcAft>
+                <a:spcPts val="0"/>
+              </a:spcAft>
+              <a:buClr>
+                <a:srgbClr val="434343"/>
+              </a:buClr>
+              <a:buSzPts val="1100"/>
+              <a:buChar char="○"/>
+            </a:pPr>
+            <a:r>
+              <a:rPr lang="en">
+                <a:solidFill>
+                  <a:srgbClr val="434343"/>
+                </a:solidFill>
+              </a:rPr>
+              <a:t>Three clusters were identified </a:t>
+            </a:r>
+            <a:endParaRPr>
+              <a:solidFill>
+                <a:srgbClr val="434343"/>
+              </a:solidFill>
+            </a:endParaRPr>
+          </a:p>
+          <a:p>
+            <a:pPr indent="-298450" lvl="2" marL="1371600" rtl="0" algn="l">
+              <a:lnSpc>
+                <a:spcPct val="150000"/>
+              </a:lnSpc>
+              <a:spcBef>
+                <a:spcPts val="0"/>
+              </a:spcBef>
+              <a:spcAft>
+                <a:spcPts val="0"/>
+              </a:spcAft>
+              <a:buClr>
+                <a:srgbClr val="434343"/>
+              </a:buClr>
+              <a:buSzPts val="1100"/>
+              <a:buChar char="■"/>
+            </a:pPr>
+            <a:r>
+              <a:rPr lang="en">
+                <a:solidFill>
+                  <a:srgbClr val="434343"/>
+                </a:solidFill>
+              </a:rPr>
+              <a:t>Cluster 1: 914 users, </a:t>
+            </a:r>
+            <a:endParaRPr>
+              <a:solidFill>
+                <a:srgbClr val="434343"/>
+              </a:solidFill>
+            </a:endParaRPr>
+          </a:p>
+          <a:p>
+            <a:pPr indent="-298450" lvl="2" marL="1371600" rtl="0" algn="l">
+              <a:lnSpc>
+                <a:spcPct val="150000"/>
+              </a:lnSpc>
+              <a:spcBef>
+                <a:spcPts val="0"/>
+              </a:spcBef>
+              <a:spcAft>
+                <a:spcPts val="0"/>
+              </a:spcAft>
+              <a:buClr>
+                <a:srgbClr val="434343"/>
+              </a:buClr>
+              <a:buSzPts val="1100"/>
+              <a:buChar char="■"/>
+            </a:pPr>
+            <a:r>
+              <a:rPr lang="en">
+                <a:solidFill>
+                  <a:srgbClr val="434343"/>
+                </a:solidFill>
+              </a:rPr>
+              <a:t>Cluster 2: 2145 users, </a:t>
+            </a:r>
+            <a:endParaRPr>
+              <a:solidFill>
+                <a:srgbClr val="434343"/>
+              </a:solidFill>
+            </a:endParaRPr>
+          </a:p>
+          <a:p>
+            <a:pPr indent="-298450" lvl="2" marL="1371600" rtl="0" algn="l">
+              <a:lnSpc>
+                <a:spcPct val="150000"/>
+              </a:lnSpc>
+              <a:spcBef>
+                <a:spcPts val="0"/>
+              </a:spcBef>
+              <a:spcAft>
+                <a:spcPts val="0"/>
+              </a:spcAft>
+              <a:buClr>
+                <a:srgbClr val="434343"/>
+              </a:buClr>
+              <a:buSzPts val="1100"/>
+              <a:buChar char="■"/>
+            </a:pPr>
+            <a:r>
+              <a:rPr lang="en">
+                <a:solidFill>
+                  <a:srgbClr val="434343"/>
+                </a:solidFill>
+              </a:rPr>
+              <a:t>Cluster 3: 248 users</a:t>
+            </a:r>
+            <a:br>
+              <a:rPr lang="en">
+                <a:solidFill>
+                  <a:srgbClr val="434343"/>
+                </a:solidFill>
+              </a:rPr>
+            </a:br>
+            <a:endParaRPr>
+              <a:solidFill>
+                <a:srgbClr val="434343"/>
+              </a:solidFill>
+            </a:endParaRPr>
+          </a:p>
+          <a:p>
+            <a:pPr indent="-311150" lvl="0" marL="457200" rtl="0" algn="l">
+              <a:lnSpc>
+                <a:spcPct val="150000"/>
+              </a:lnSpc>
+              <a:spcBef>
+                <a:spcPts val="0"/>
+              </a:spcBef>
+              <a:spcAft>
+                <a:spcPts val="0"/>
+              </a:spcAft>
+              <a:buClr>
+                <a:srgbClr val="434343"/>
+              </a:buClr>
+              <a:buSzPts val="1300"/>
+              <a:buChar char="●"/>
+            </a:pPr>
+            <a:r>
+              <a:rPr lang="en">
+                <a:solidFill>
+                  <a:srgbClr val="434343"/>
+                </a:solidFill>
+              </a:rPr>
+              <a:t>Hierarchical (Agglomerative)</a:t>
+            </a:r>
+            <a:r>
+              <a:rPr lang="en">
+                <a:solidFill>
+                  <a:srgbClr val="434343"/>
+                </a:solidFill>
+              </a:rPr>
+              <a:t> Clustering based on Scaled user features (Usage Ratings)</a:t>
+            </a:r>
+            <a:endParaRPr>
+              <a:solidFill>
+                <a:srgbClr val="434343"/>
+              </a:solidFill>
+            </a:endParaRPr>
+          </a:p>
+          <a:p>
+            <a:pPr indent="-298450" lvl="1" marL="914400" rtl="0" algn="l">
+              <a:lnSpc>
+                <a:spcPct val="150000"/>
+              </a:lnSpc>
+              <a:spcBef>
+                <a:spcPts val="0"/>
+              </a:spcBef>
+              <a:spcAft>
+                <a:spcPts val="0"/>
+              </a:spcAft>
+              <a:buClr>
+                <a:srgbClr val="434343"/>
+              </a:buClr>
+              <a:buSzPts val="1100"/>
+              <a:buChar char="○"/>
+            </a:pPr>
+            <a:r>
+              <a:rPr lang="en">
+                <a:solidFill>
+                  <a:srgbClr val="434343"/>
+                </a:solidFill>
+              </a:rPr>
+              <a:t>Best no of clusters were identified as 3.</a:t>
+            </a:r>
+            <a:endParaRPr>
+              <a:solidFill>
+                <a:srgbClr val="434343"/>
+              </a:solidFill>
+            </a:endParaRPr>
+          </a:p>
+          <a:p>
+            <a:pPr indent="-298450" lvl="1" marL="914400" rtl="0" algn="l">
+              <a:lnSpc>
+                <a:spcPct val="150000"/>
+              </a:lnSpc>
+              <a:spcBef>
+                <a:spcPts val="0"/>
+              </a:spcBef>
+              <a:spcAft>
+                <a:spcPts val="0"/>
+              </a:spcAft>
+              <a:buClr>
+                <a:srgbClr val="434343"/>
+              </a:buClr>
+              <a:buSzPts val="1100"/>
+              <a:buChar char="○"/>
+            </a:pPr>
+            <a:r>
+              <a:rPr lang="en">
+                <a:solidFill>
+                  <a:srgbClr val="434343"/>
+                </a:solidFill>
+              </a:rPr>
+              <a:t>Considered euclidean distances</a:t>
+            </a:r>
+            <a:endParaRPr>
+              <a:solidFill>
+                <a:srgbClr val="434343"/>
+              </a:solidFill>
+            </a:endParaRPr>
+          </a:p>
+        </p:txBody>
+      </p:sp>
+    </p:spTree>
+  </p:cSld>
+  <p:clrMapOvr>
+    <a:masterClrMapping/>
+  </p:clrMapOvr>
+</p:sld>
+</file>
+
+<file path=ppt/slides/slide48.xml><?xml version="1.0" encoding="utf-8"?>
+<p:sld xmlns:a="http://schemas.openxmlformats.org/drawingml/2006/main" xmlns:r="http://schemas.openxmlformats.org/officeDocument/2006/relationships" xmlns:mc="http://schemas.openxmlformats.org/markup-compatibility/2006" xmlns:mv="urn:schemas-microsoft-com:mac:vml" xmlns:p="http://schemas.openxmlformats.org/presentationml/2006/main" xmlns:c="http://schemas.openxmlformats.org/drawingml/2006/chart" xmlns:dgm="http://schemas.openxmlformats.org/drawingml/2006/diagram" xmlns:o="urn:schemas-microsoft-com:office:office" xmlns:v="urn:schemas-microsoft-com:vml" xmlns:pvml="urn:schemas-microsoft-com:office:powerpoint" xmlns:com="http://schemas.openxmlformats.org/drawingml/2006/compatibility" xmlns:p14="http://schemas.microsoft.com/office/powerpoint/2010/main" xmlns:p15="http://schemas.microsoft.com/office/powerpoint/2012/main" xmlns:ahyp="http://schemas.microsoft.com/office/drawing/2018/hyperlinkcolor">
+  <p:cSld>
+    <p:spTree>
+      <p:nvGrpSpPr>
+        <p:cNvPr id="439" name="Shape 439"/>
+        <p:cNvGrpSpPr/>
+        <p:nvPr/>
+      </p:nvGrpSpPr>
+      <p:grpSpPr>
+        <a:xfrm>
+          <a:off x="0" y="0"/>
+          <a:ext cx="0" cy="0"/>
+          <a:chOff x="0" y="0"/>
+          <a:chExt cx="0" cy="0"/>
+        </a:xfrm>
+      </p:grpSpPr>
+      <p:sp>
+        <p:nvSpPr>
+          <p:cNvPr id="440" name="Google Shape;440;p60"/>
+          <p:cNvSpPr txBox="1"/>
+          <p:nvPr>
+            <p:ph type="title"/>
+          </p:nvPr>
+        </p:nvSpPr>
+        <p:spPr>
+          <a:xfrm>
+            <a:off x="727650" y="599950"/>
+            <a:ext cx="7688700" cy="535200"/>
+          </a:xfrm>
+          <a:prstGeom prst="rect">
+            <a:avLst/>
+          </a:prstGeom>
+        </p:spPr>
+        <p:txBody>
+          <a:bodyPr anchorCtr="0" anchor="t" bIns="91425" lIns="91425" spcFirstLastPara="1" rIns="91425" wrap="square" tIns="91425">
+            <a:normAutofit fontScale="90000"/>
+          </a:bodyPr>
+          <a:lstStyle/>
+          <a:p>
+            <a:pPr indent="0" lvl="0" marL="0" rtl="0" algn="l">
+              <a:spcBef>
+                <a:spcPts val="0"/>
+              </a:spcBef>
+              <a:spcAft>
+                <a:spcPts val="0"/>
+              </a:spcAft>
+              <a:buNone/>
+            </a:pPr>
+            <a:r>
+              <a:rPr lang="en"/>
+              <a:t>User Profile : Clustering Users</a:t>
+            </a:r>
+            <a:endParaRPr/>
+          </a:p>
+        </p:txBody>
+      </p:sp>
+      <p:sp>
+        <p:nvSpPr>
+          <p:cNvPr id="441" name="Google Shape;441;p60"/>
+          <p:cNvSpPr txBox="1"/>
           <p:nvPr/>
         </p:nvSpPr>
         <p:spPr>
@@ -26732,7 +27254,7 @@
       </p:sp>
       <p:pic>
         <p:nvPicPr>
-          <p:cNvPr id="436" name="Google Shape;436;p59"/>
+          <p:cNvPr id="442" name="Google Shape;442;p60"/>
           <p:cNvPicPr preferRelativeResize="0"/>
           <p:nvPr/>
         </p:nvPicPr>
@@ -26758,36 +27280,9 @@
           </a:ln>
         </p:spPr>
       </p:pic>
-      <p:pic>
-        <p:nvPicPr>
-          <p:cNvPr id="437" name="Google Shape;437;p59"/>
-          <p:cNvPicPr preferRelativeResize="0"/>
-          <p:nvPr/>
-        </p:nvPicPr>
-        <p:blipFill rotWithShape="1">
-          <a:blip r:embed="rId4">
-            <a:alphaModFix/>
-          </a:blip>
-          <a:srcRect b="0" l="1146" r="0" t="0"/>
-          <a:stretch/>
-        </p:blipFill>
-        <p:spPr>
-          <a:xfrm>
-            <a:off x="3799175" y="1662100"/>
-            <a:ext cx="2351553" cy="2228025"/>
-          </a:xfrm>
-          <a:prstGeom prst="rect">
-            <a:avLst/>
-          </a:prstGeom>
-          <a:noFill/>
-          <a:ln>
-            <a:noFill/>
-          </a:ln>
-        </p:spPr>
-      </p:pic>
       <p:sp>
         <p:nvSpPr>
-          <p:cNvPr id="438" name="Google Shape;438;p59"/>
+          <p:cNvPr id="443" name="Google Shape;443;p60"/>
           <p:cNvSpPr txBox="1"/>
           <p:nvPr/>
         </p:nvSpPr>
@@ -26839,7 +27334,35 @@
       </p:sp>
       <p:pic>
         <p:nvPicPr>
-          <p:cNvPr id="439" name="Google Shape;439;p59"/>
+          <p:cNvPr id="444" name="Google Shape;444;p60"/>
+          <p:cNvPicPr preferRelativeResize="0"/>
+          <p:nvPr/>
+        </p:nvPicPr>
+        <p:blipFill>
+          <a:blip r:embed="rId4">
+            <a:alphaModFix/>
+          </a:blip>
+          <a:stretch>
+            <a:fillRect/>
+          </a:stretch>
+        </p:blipFill>
+        <p:spPr>
+          <a:xfrm>
+            <a:off x="3221875" y="1540300"/>
+            <a:ext cx="2859790" cy="2341875"/>
+          </a:xfrm>
+          <a:prstGeom prst="rect">
+            <a:avLst/>
+          </a:prstGeom>
+          <a:noFill/>
+          <a:ln>
+            <a:noFill/>
+          </a:ln>
+        </p:spPr>
+      </p:pic>
+      <p:pic>
+        <p:nvPicPr>
+          <p:cNvPr id="445" name="Google Shape;445;p60"/>
           <p:cNvPicPr preferRelativeResize="0"/>
           <p:nvPr/>
         </p:nvPicPr>
@@ -26853,8 +27376,8 @@
         </p:blipFill>
         <p:spPr>
           <a:xfrm>
-            <a:off x="6190225" y="2176437"/>
-            <a:ext cx="2714999" cy="1370300"/>
+            <a:off x="5797925" y="1985425"/>
+            <a:ext cx="2961999" cy="1484775"/>
           </a:xfrm>
           <a:prstGeom prst="rect">
             <a:avLst/>
@@ -26873,12 +27396,12 @@
 </p:sld>
 </file>
 
-<file path=ppt/slides/slide48.xml><?xml version="1.0" encoding="utf-8"?>
+<file path=ppt/slides/slide49.xml><?xml version="1.0" encoding="utf-8"?>
 <p:sld xmlns:a="http://schemas.openxmlformats.org/drawingml/2006/main" xmlns:r="http://schemas.openxmlformats.org/officeDocument/2006/relationships" xmlns:mc="http://schemas.openxmlformats.org/markup-compatibility/2006" xmlns:mv="urn:schemas-microsoft-com:mac:vml" xmlns:p="http://schemas.openxmlformats.org/presentationml/2006/main" xmlns:c="http://schemas.openxmlformats.org/drawingml/2006/chart" xmlns:dgm="http://schemas.openxmlformats.org/drawingml/2006/diagram" xmlns:o="urn:schemas-microsoft-com:office:office" xmlns:v="urn:schemas-microsoft-com:vml" xmlns:pvml="urn:schemas-microsoft-com:office:powerpoint" xmlns:com="http://schemas.openxmlformats.org/drawingml/2006/compatibility" xmlns:p14="http://schemas.microsoft.com/office/powerpoint/2010/main" xmlns:p15="http://schemas.microsoft.com/office/powerpoint/2012/main" xmlns:ahyp="http://schemas.microsoft.com/office/drawing/2018/hyperlinkcolor">
   <p:cSld>
     <p:spTree>
       <p:nvGrpSpPr>
-        <p:cNvPr id="443" name="Shape 443"/>
+        <p:cNvPr id="449" name="Shape 449"/>
         <p:cNvGrpSpPr/>
         <p:nvPr/>
       </p:nvGrpSpPr>
@@ -26892,7 +27415,7 @@
       </p:grpSpPr>
       <p:sp>
         <p:nvSpPr>
-          <p:cNvPr id="444" name="Google Shape;444;p60"/>
+          <p:cNvPr id="450" name="Google Shape;450;p61"/>
           <p:cNvSpPr txBox="1"/>
           <p:nvPr>
             <p:ph type="title"/>
@@ -26932,7 +27455,7 @@
       </p:sp>
       <p:pic>
         <p:nvPicPr>
-          <p:cNvPr id="445" name="Google Shape;445;p60"/>
+          <p:cNvPr id="451" name="Google Shape;451;p61"/>
           <p:cNvPicPr preferRelativeResize="0"/>
           <p:nvPr/>
         </p:nvPicPr>
@@ -26960,7 +27483,7 @@
       </p:pic>
       <p:sp>
         <p:nvSpPr>
-          <p:cNvPr id="446" name="Google Shape;446;p60"/>
+          <p:cNvPr id="452" name="Google Shape;452;p61"/>
           <p:cNvSpPr txBox="1"/>
           <p:nvPr/>
         </p:nvSpPr>
@@ -27010,138 +27533,6 @@
           </a:p>
         </p:txBody>
       </p:sp>
-    </p:spTree>
-  </p:cSld>
-  <p:clrMapOvr>
-    <a:masterClrMapping/>
-  </p:clrMapOvr>
-</p:sld>
-</file>
-
-<file path=ppt/slides/slide49.xml><?xml version="1.0" encoding="utf-8"?>
-<p:sld xmlns:a="http://schemas.openxmlformats.org/drawingml/2006/main" xmlns:r="http://schemas.openxmlformats.org/officeDocument/2006/relationships" xmlns:mc="http://schemas.openxmlformats.org/markup-compatibility/2006" xmlns:mv="urn:schemas-microsoft-com:mac:vml" xmlns:p="http://schemas.openxmlformats.org/presentationml/2006/main" xmlns:c="http://schemas.openxmlformats.org/drawingml/2006/chart" xmlns:dgm="http://schemas.openxmlformats.org/drawingml/2006/diagram" xmlns:o="urn:schemas-microsoft-com:office:office" xmlns:v="urn:schemas-microsoft-com:vml" xmlns:pvml="urn:schemas-microsoft-com:office:powerpoint" xmlns:com="http://schemas.openxmlformats.org/drawingml/2006/compatibility" xmlns:p14="http://schemas.microsoft.com/office/powerpoint/2010/main" xmlns:p15="http://schemas.microsoft.com/office/powerpoint/2012/main" xmlns:ahyp="http://schemas.microsoft.com/office/drawing/2018/hyperlinkcolor">
-  <p:cSld>
-    <p:spTree>
-      <p:nvGrpSpPr>
-        <p:cNvPr id="450" name="Shape 450"/>
-        <p:cNvGrpSpPr/>
-        <p:nvPr/>
-      </p:nvGrpSpPr>
-      <p:grpSpPr>
-        <a:xfrm>
-          <a:off x="0" y="0"/>
-          <a:ext cx="0" cy="0"/>
-          <a:chOff x="0" y="0"/>
-          <a:chExt cx="0" cy="0"/>
-        </a:xfrm>
-      </p:grpSpPr>
-      <p:sp>
-        <p:nvSpPr>
-          <p:cNvPr id="451" name="Google Shape;451;p61"/>
-          <p:cNvSpPr txBox="1"/>
-          <p:nvPr>
-            <p:ph type="title"/>
-          </p:nvPr>
-        </p:nvSpPr>
-        <p:spPr>
-          <a:xfrm>
-            <a:off x="868025" y="1325925"/>
-            <a:ext cx="3300900" cy="1687200"/>
-          </a:xfrm>
-          <a:prstGeom prst="rect">
-            <a:avLst/>
-          </a:prstGeom>
-        </p:spPr>
-        <p:txBody>
-          <a:bodyPr anchorCtr="0" anchor="t" bIns="91425" lIns="91425" spcFirstLastPara="1" rIns="91425" wrap="square" tIns="91425">
-            <a:noAutofit/>
-          </a:bodyPr>
-          <a:lstStyle/>
-          <a:p>
-            <a:pPr indent="0" lvl="0" marL="0" rtl="0" algn="l">
-              <a:spcBef>
-                <a:spcPts val="0"/>
-              </a:spcBef>
-              <a:spcAft>
-                <a:spcPts val="0"/>
-              </a:spcAft>
-              <a:buNone/>
-            </a:pPr>
-            <a:r>
-              <a:rPr lang="en" sz="3500"/>
-              <a:t>Extended Product Profiles</a:t>
-            </a:r>
-            <a:endParaRPr sz="3500"/>
-          </a:p>
-        </p:txBody>
-      </p:sp>
-      <p:sp>
-        <p:nvSpPr>
-          <p:cNvPr id="452" name="Google Shape;452;p61"/>
-          <p:cNvSpPr txBox="1"/>
-          <p:nvPr>
-            <p:ph idx="1" type="subTitle"/>
-          </p:nvPr>
-        </p:nvSpPr>
-        <p:spPr>
-          <a:xfrm>
-            <a:off x="724950" y="3161525"/>
-            <a:ext cx="3300900" cy="759000"/>
-          </a:xfrm>
-          <a:prstGeom prst="rect">
-            <a:avLst/>
-          </a:prstGeom>
-        </p:spPr>
-        <p:txBody>
-          <a:bodyPr anchorCtr="0" anchor="t" bIns="91425" lIns="91425" spcFirstLastPara="1" rIns="91425" wrap="square" tIns="91425">
-            <a:normAutofit/>
-          </a:bodyPr>
-          <a:lstStyle/>
-          <a:p>
-            <a:pPr indent="0" lvl="0" marL="0" rtl="0" algn="l">
-              <a:spcBef>
-                <a:spcPts val="0"/>
-              </a:spcBef>
-              <a:spcAft>
-                <a:spcPts val="0"/>
-              </a:spcAft>
-              <a:buNone/>
-            </a:pPr>
-            <a:r>
-              <a:t/>
-            </a:r>
-            <a:endParaRPr/>
-          </a:p>
-        </p:txBody>
-      </p:sp>
-      <p:pic>
-        <p:nvPicPr>
-          <p:cNvPr id="453" name="Google Shape;453;p61"/>
-          <p:cNvPicPr preferRelativeResize="0"/>
-          <p:nvPr/>
-        </p:nvPicPr>
-        <p:blipFill>
-          <a:blip r:embed="rId3">
-            <a:alphaModFix/>
-          </a:blip>
-          <a:stretch>
-            <a:fillRect/>
-          </a:stretch>
-        </p:blipFill>
-        <p:spPr>
-          <a:xfrm>
-            <a:off x="5621725" y="1162225"/>
-            <a:ext cx="2637275" cy="2637275"/>
-          </a:xfrm>
-          <a:prstGeom prst="rect">
-            <a:avLst/>
-          </a:prstGeom>
-          <a:noFill/>
-          <a:ln>
-            <a:noFill/>
-          </a:ln>
-        </p:spPr>
-      </p:pic>
     </p:spTree>
   </p:cSld>
   <p:clrMapOvr>
@@ -27517,7 +27908,7 @@
   <p:cSld>
     <p:spTree>
       <p:nvGrpSpPr>
-        <p:cNvPr id="457" name="Shape 457"/>
+        <p:cNvPr id="456" name="Shape 456"/>
         <p:cNvGrpSpPr/>
         <p:nvPr/>
       </p:nvGrpSpPr>
@@ -27531,7 +27922,139 @@
       </p:grpSpPr>
       <p:sp>
         <p:nvSpPr>
+          <p:cNvPr id="457" name="Google Shape;457;p62"/>
+          <p:cNvSpPr txBox="1"/>
+          <p:nvPr>
+            <p:ph type="title"/>
+          </p:nvPr>
+        </p:nvSpPr>
+        <p:spPr>
+          <a:xfrm>
+            <a:off x="868025" y="1325925"/>
+            <a:ext cx="3300900" cy="1687200"/>
+          </a:xfrm>
+          <a:prstGeom prst="rect">
+            <a:avLst/>
+          </a:prstGeom>
+        </p:spPr>
+        <p:txBody>
+          <a:bodyPr anchorCtr="0" anchor="t" bIns="91425" lIns="91425" spcFirstLastPara="1" rIns="91425" wrap="square" tIns="91425">
+            <a:noAutofit/>
+          </a:bodyPr>
+          <a:lstStyle/>
+          <a:p>
+            <a:pPr indent="0" lvl="0" marL="0" rtl="0" algn="l">
+              <a:spcBef>
+                <a:spcPts val="0"/>
+              </a:spcBef>
+              <a:spcAft>
+                <a:spcPts val="0"/>
+              </a:spcAft>
+              <a:buNone/>
+            </a:pPr>
+            <a:r>
+              <a:rPr lang="en" sz="3500"/>
+              <a:t>Extended Product Profiles</a:t>
+            </a:r>
+            <a:endParaRPr sz="3500"/>
+          </a:p>
+        </p:txBody>
+      </p:sp>
+      <p:sp>
+        <p:nvSpPr>
           <p:cNvPr id="458" name="Google Shape;458;p62"/>
+          <p:cNvSpPr txBox="1"/>
+          <p:nvPr>
+            <p:ph idx="1" type="subTitle"/>
+          </p:nvPr>
+        </p:nvSpPr>
+        <p:spPr>
+          <a:xfrm>
+            <a:off x="724950" y="3161525"/>
+            <a:ext cx="3300900" cy="759000"/>
+          </a:xfrm>
+          <a:prstGeom prst="rect">
+            <a:avLst/>
+          </a:prstGeom>
+        </p:spPr>
+        <p:txBody>
+          <a:bodyPr anchorCtr="0" anchor="t" bIns="91425" lIns="91425" spcFirstLastPara="1" rIns="91425" wrap="square" tIns="91425">
+            <a:normAutofit/>
+          </a:bodyPr>
+          <a:lstStyle/>
+          <a:p>
+            <a:pPr indent="0" lvl="0" marL="0" rtl="0" algn="l">
+              <a:spcBef>
+                <a:spcPts val="0"/>
+              </a:spcBef>
+              <a:spcAft>
+                <a:spcPts val="0"/>
+              </a:spcAft>
+              <a:buNone/>
+            </a:pPr>
+            <a:r>
+              <a:t/>
+            </a:r>
+            <a:endParaRPr/>
+          </a:p>
+        </p:txBody>
+      </p:sp>
+      <p:pic>
+        <p:nvPicPr>
+          <p:cNvPr id="459" name="Google Shape;459;p62"/>
+          <p:cNvPicPr preferRelativeResize="0"/>
+          <p:nvPr/>
+        </p:nvPicPr>
+        <p:blipFill>
+          <a:blip r:embed="rId3">
+            <a:alphaModFix/>
+          </a:blip>
+          <a:stretch>
+            <a:fillRect/>
+          </a:stretch>
+        </p:blipFill>
+        <p:spPr>
+          <a:xfrm>
+            <a:off x="5621725" y="1162225"/>
+            <a:ext cx="2637275" cy="2637275"/>
+          </a:xfrm>
+          <a:prstGeom prst="rect">
+            <a:avLst/>
+          </a:prstGeom>
+          <a:noFill/>
+          <a:ln>
+            <a:noFill/>
+          </a:ln>
+        </p:spPr>
+      </p:pic>
+    </p:spTree>
+  </p:cSld>
+  <p:clrMapOvr>
+    <a:masterClrMapping/>
+  </p:clrMapOvr>
+</p:sld>
+</file>
+
+<file path=ppt/slides/slide51.xml><?xml version="1.0" encoding="utf-8"?>
+<p:sld xmlns:a="http://schemas.openxmlformats.org/drawingml/2006/main" xmlns:r="http://schemas.openxmlformats.org/officeDocument/2006/relationships" xmlns:mc="http://schemas.openxmlformats.org/markup-compatibility/2006" xmlns:mv="urn:schemas-microsoft-com:mac:vml" xmlns:p="http://schemas.openxmlformats.org/presentationml/2006/main" xmlns:c="http://schemas.openxmlformats.org/drawingml/2006/chart" xmlns:dgm="http://schemas.openxmlformats.org/drawingml/2006/diagram" xmlns:o="urn:schemas-microsoft-com:office:office" xmlns:v="urn:schemas-microsoft-com:vml" xmlns:pvml="urn:schemas-microsoft-com:office:powerpoint" xmlns:com="http://schemas.openxmlformats.org/drawingml/2006/compatibility" xmlns:p14="http://schemas.microsoft.com/office/powerpoint/2010/main" xmlns:p15="http://schemas.microsoft.com/office/powerpoint/2012/main" xmlns:ahyp="http://schemas.microsoft.com/office/drawing/2018/hyperlinkcolor">
+  <p:cSld>
+    <p:spTree>
+      <p:nvGrpSpPr>
+        <p:cNvPr id="463" name="Shape 463"/>
+        <p:cNvGrpSpPr/>
+        <p:nvPr/>
+      </p:nvGrpSpPr>
+      <p:grpSpPr>
+        <a:xfrm>
+          <a:off x="0" y="0"/>
+          <a:ext cx="0" cy="0"/>
+          <a:chOff x="0" y="0"/>
+          <a:chExt cx="0" cy="0"/>
+        </a:xfrm>
+      </p:grpSpPr>
+      <p:sp>
+        <p:nvSpPr>
+          <p:cNvPr id="464" name="Google Shape;464;p63"/>
           <p:cNvSpPr txBox="1"/>
           <p:nvPr>
             <p:ph type="title"/>
@@ -27575,7 +28098,7 @@
       </p:sp>
       <p:sp>
         <p:nvSpPr>
-          <p:cNvPr id="459" name="Google Shape;459;p62"/>
+          <p:cNvPr id="465" name="Google Shape;465;p63"/>
           <p:cNvSpPr txBox="1"/>
           <p:nvPr>
             <p:ph idx="1" type="body"/>
@@ -27979,7 +28502,7 @@
       </p:sp>
       <p:sp>
         <p:nvSpPr>
-          <p:cNvPr id="460" name="Google Shape;460;p62"/>
+          <p:cNvPr id="466" name="Google Shape;466;p63"/>
           <p:cNvSpPr txBox="1"/>
           <p:nvPr/>
         </p:nvSpPr>
@@ -28051,634 +28574,6 @@
               <a:ea typeface="Lato"/>
               <a:cs typeface="Lato"/>
               <a:sym typeface="Lato"/>
-            </a:endParaRPr>
-          </a:p>
-        </p:txBody>
-      </p:sp>
-    </p:spTree>
-  </p:cSld>
-  <p:clrMapOvr>
-    <a:masterClrMapping/>
-  </p:clrMapOvr>
-</p:sld>
-</file>
-
-<file path=ppt/slides/slide51.xml><?xml version="1.0" encoding="utf-8"?>
-<p:sld xmlns:a="http://schemas.openxmlformats.org/drawingml/2006/main" xmlns:r="http://schemas.openxmlformats.org/officeDocument/2006/relationships" xmlns:mc="http://schemas.openxmlformats.org/markup-compatibility/2006" xmlns:mv="urn:schemas-microsoft-com:mac:vml" xmlns:p="http://schemas.openxmlformats.org/presentationml/2006/main" xmlns:c="http://schemas.openxmlformats.org/drawingml/2006/chart" xmlns:dgm="http://schemas.openxmlformats.org/drawingml/2006/diagram" xmlns:o="urn:schemas-microsoft-com:office:office" xmlns:v="urn:schemas-microsoft-com:vml" xmlns:pvml="urn:schemas-microsoft-com:office:powerpoint" xmlns:com="http://schemas.openxmlformats.org/drawingml/2006/compatibility" xmlns:p14="http://schemas.microsoft.com/office/powerpoint/2010/main" xmlns:p15="http://schemas.microsoft.com/office/powerpoint/2012/main" xmlns:ahyp="http://schemas.microsoft.com/office/drawing/2018/hyperlinkcolor">
-  <p:cSld>
-    <p:spTree>
-      <p:nvGrpSpPr>
-        <p:cNvPr id="464" name="Shape 464"/>
-        <p:cNvGrpSpPr/>
-        <p:nvPr/>
-      </p:nvGrpSpPr>
-      <p:grpSpPr>
-        <a:xfrm>
-          <a:off x="0" y="0"/>
-          <a:ext cx="0" cy="0"/>
-          <a:chOff x="0" y="0"/>
-          <a:chExt cx="0" cy="0"/>
-        </a:xfrm>
-      </p:grpSpPr>
-      <p:sp>
-        <p:nvSpPr>
-          <p:cNvPr id="465" name="Google Shape;465;p63"/>
-          <p:cNvSpPr txBox="1"/>
-          <p:nvPr>
-            <p:ph type="title"/>
-          </p:nvPr>
-        </p:nvSpPr>
-        <p:spPr>
-          <a:xfrm>
-            <a:off x="727650" y="599950"/>
-            <a:ext cx="7688700" cy="535200"/>
-          </a:xfrm>
-          <a:prstGeom prst="rect">
-            <a:avLst/>
-          </a:prstGeom>
-        </p:spPr>
-        <p:txBody>
-          <a:bodyPr anchorCtr="0" anchor="t" bIns="91425" lIns="91425" spcFirstLastPara="1" rIns="91425" wrap="square" tIns="91425">
-            <a:normAutofit fontScale="90000"/>
-          </a:bodyPr>
-          <a:lstStyle/>
-          <a:p>
-            <a:pPr indent="0" lvl="0" marL="0" rtl="0" algn="l">
-              <a:spcBef>
-                <a:spcPts val="0"/>
-              </a:spcBef>
-              <a:spcAft>
-                <a:spcPts val="0"/>
-              </a:spcAft>
-              <a:buNone/>
-            </a:pPr>
-            <a:r>
-              <a:rPr lang="en"/>
-              <a:t>Product</a:t>
-            </a:r>
-            <a:r>
-              <a:rPr lang="en"/>
-              <a:t> Profiles: Available features</a:t>
-            </a:r>
-            <a:endParaRPr/>
-          </a:p>
-        </p:txBody>
-      </p:sp>
-      <p:sp>
-        <p:nvSpPr>
-          <p:cNvPr id="466" name="Google Shape;466;p63"/>
-          <p:cNvSpPr txBox="1"/>
-          <p:nvPr>
-            <p:ph idx="1" type="body"/>
-          </p:nvPr>
-        </p:nvSpPr>
-        <p:spPr>
-          <a:xfrm>
-            <a:off x="697250" y="1383875"/>
-            <a:ext cx="5143500" cy="3835800"/>
-          </a:xfrm>
-          <a:prstGeom prst="rect">
-            <a:avLst/>
-          </a:prstGeom>
-        </p:spPr>
-        <p:txBody>
-          <a:bodyPr anchorCtr="0" anchor="t" bIns="91425" lIns="91425" spcFirstLastPara="1" rIns="91425" wrap="square" tIns="91425">
-            <a:normAutofit fontScale="92500" lnSpcReduction="20000"/>
-          </a:bodyPr>
-          <a:lstStyle/>
-          <a:p>
-            <a:pPr indent="-304958" lvl="0" marL="457200" rtl="0" algn="l">
-              <a:lnSpc>
-                <a:spcPct val="150000"/>
-              </a:lnSpc>
-              <a:spcBef>
-                <a:spcPts val="0"/>
-              </a:spcBef>
-              <a:spcAft>
-                <a:spcPts val="0"/>
-              </a:spcAft>
-              <a:buClr>
-                <a:srgbClr val="434343"/>
-              </a:buClr>
-              <a:buSzPct val="100000"/>
-              <a:buChar char="●"/>
-            </a:pPr>
-            <a:r>
-              <a:rPr lang="en">
-                <a:solidFill>
-                  <a:srgbClr val="434343"/>
-                </a:solidFill>
-              </a:rPr>
-              <a:t>Common features</a:t>
-            </a:r>
-            <a:r>
-              <a:rPr lang="en">
-                <a:solidFill>
-                  <a:srgbClr val="434343"/>
-                </a:solidFill>
-              </a:rPr>
-              <a:t>:</a:t>
-            </a:r>
-            <a:endParaRPr>
-              <a:solidFill>
-                <a:srgbClr val="434343"/>
-              </a:solidFill>
-            </a:endParaRPr>
-          </a:p>
-          <a:p>
-            <a:pPr indent="-293211" lvl="1" marL="914400" rtl="0" algn="l">
-              <a:lnSpc>
-                <a:spcPct val="150000"/>
-              </a:lnSpc>
-              <a:spcBef>
-                <a:spcPts val="0"/>
-              </a:spcBef>
-              <a:spcAft>
-                <a:spcPts val="0"/>
-              </a:spcAft>
-              <a:buClr>
-                <a:srgbClr val="434343"/>
-              </a:buClr>
-              <a:buSzPct val="100000"/>
-              <a:buChar char="○"/>
-            </a:pPr>
-            <a:r>
-              <a:rPr lang="en">
-                <a:solidFill>
-                  <a:srgbClr val="434343"/>
-                </a:solidFill>
-              </a:rPr>
-              <a:t>Product_ID - product code</a:t>
-            </a:r>
-            <a:endParaRPr>
-              <a:solidFill>
-                <a:srgbClr val="434343"/>
-              </a:solidFill>
-            </a:endParaRPr>
-          </a:p>
-          <a:p>
-            <a:pPr indent="-293211" lvl="1" marL="914400" rtl="0" algn="l">
-              <a:lnSpc>
-                <a:spcPct val="150000"/>
-              </a:lnSpc>
-              <a:spcBef>
-                <a:spcPts val="0"/>
-              </a:spcBef>
-              <a:spcAft>
-                <a:spcPts val="0"/>
-              </a:spcAft>
-              <a:buClr>
-                <a:srgbClr val="434343"/>
-              </a:buClr>
-              <a:buSzPct val="100000"/>
-              <a:buChar char="○"/>
-            </a:pPr>
-            <a:r>
-              <a:rPr lang="en">
-                <a:solidFill>
-                  <a:srgbClr val="434343"/>
-                </a:solidFill>
-              </a:rPr>
-              <a:t>Base_Type (BB/VOICE/PEOTV)</a:t>
-            </a:r>
-            <a:endParaRPr>
-              <a:solidFill>
-                <a:srgbClr val="434343"/>
-              </a:solidFill>
-            </a:endParaRPr>
-          </a:p>
-          <a:p>
-            <a:pPr indent="-293211" lvl="1" marL="914400" rtl="0" algn="l">
-              <a:lnSpc>
-                <a:spcPct val="150000"/>
-              </a:lnSpc>
-              <a:spcBef>
-                <a:spcPts val="0"/>
-              </a:spcBef>
-              <a:spcAft>
-                <a:spcPts val="0"/>
-              </a:spcAft>
-              <a:buClr>
-                <a:srgbClr val="434343"/>
-              </a:buClr>
-              <a:buSzPct val="100000"/>
-              <a:buChar char="○"/>
-            </a:pPr>
-            <a:r>
-              <a:rPr lang="en">
-                <a:solidFill>
-                  <a:srgbClr val="434343"/>
-                </a:solidFill>
-              </a:rPr>
-              <a:t>Pricing_Type (PAID/FREE)</a:t>
-            </a:r>
-            <a:endParaRPr>
-              <a:solidFill>
-                <a:srgbClr val="434343"/>
-              </a:solidFill>
-            </a:endParaRPr>
-          </a:p>
-          <a:p>
-            <a:pPr indent="-293211" lvl="1" marL="914400" rtl="0" algn="l">
-              <a:lnSpc>
-                <a:spcPct val="150000"/>
-              </a:lnSpc>
-              <a:spcBef>
-                <a:spcPts val="0"/>
-              </a:spcBef>
-              <a:spcAft>
-                <a:spcPts val="0"/>
-              </a:spcAft>
-              <a:buClr>
-                <a:srgbClr val="434343"/>
-              </a:buClr>
-              <a:buSzPct val="100000"/>
-              <a:buChar char="○"/>
-            </a:pPr>
-            <a:r>
-              <a:rPr lang="en">
-                <a:solidFill>
-                  <a:srgbClr val="434343"/>
-                </a:solidFill>
-              </a:rPr>
-              <a:t>Package_Type (ADSL/Fibre/4G/Telephone/PeoTV)</a:t>
-            </a:r>
-            <a:endParaRPr>
-              <a:solidFill>
-                <a:srgbClr val="434343"/>
-              </a:solidFill>
-            </a:endParaRPr>
-          </a:p>
-          <a:p>
-            <a:pPr indent="-293211" lvl="1" marL="914400" rtl="0" algn="l">
-              <a:lnSpc>
-                <a:spcPct val="150000"/>
-              </a:lnSpc>
-              <a:spcBef>
-                <a:spcPts val="0"/>
-              </a:spcBef>
-              <a:spcAft>
-                <a:spcPts val="0"/>
-              </a:spcAft>
-              <a:buClr>
-                <a:srgbClr val="434343"/>
-              </a:buClr>
-              <a:buSzPct val="100000"/>
-              <a:buChar char="○"/>
-            </a:pPr>
-            <a:r>
-              <a:rPr lang="en">
-                <a:solidFill>
-                  <a:srgbClr val="434343"/>
-                </a:solidFill>
-              </a:rPr>
-              <a:t>VAS (YES/NO) - value added service</a:t>
-            </a:r>
-            <a:endParaRPr>
-              <a:solidFill>
-                <a:srgbClr val="434343"/>
-              </a:solidFill>
-            </a:endParaRPr>
-          </a:p>
-          <a:p>
-            <a:pPr indent="-293211" lvl="1" marL="914400" rtl="0" algn="l">
-              <a:lnSpc>
-                <a:spcPct val="150000"/>
-              </a:lnSpc>
-              <a:spcBef>
-                <a:spcPts val="0"/>
-              </a:spcBef>
-              <a:spcAft>
-                <a:spcPts val="0"/>
-              </a:spcAft>
-              <a:buClr>
-                <a:srgbClr val="434343"/>
-              </a:buClr>
-              <a:buSzPct val="100000"/>
-              <a:buChar char="○"/>
-            </a:pPr>
-            <a:r>
-              <a:rPr lang="en">
-                <a:solidFill>
-                  <a:srgbClr val="434343"/>
-                </a:solidFill>
-              </a:rPr>
-              <a:t>Title and Description</a:t>
-            </a:r>
-            <a:endParaRPr>
-              <a:solidFill>
-                <a:srgbClr val="434343"/>
-              </a:solidFill>
-            </a:endParaRPr>
-          </a:p>
-          <a:p>
-            <a:pPr indent="-293211" lvl="1" marL="914400" rtl="0" algn="l">
-              <a:lnSpc>
-                <a:spcPct val="150000"/>
-              </a:lnSpc>
-              <a:spcBef>
-                <a:spcPts val="0"/>
-              </a:spcBef>
-              <a:spcAft>
-                <a:spcPts val="0"/>
-              </a:spcAft>
-              <a:buClr>
-                <a:srgbClr val="434343"/>
-              </a:buClr>
-              <a:buSzPct val="100000"/>
-              <a:buChar char="○"/>
-            </a:pPr>
-            <a:r>
-              <a:rPr lang="en">
-                <a:solidFill>
-                  <a:srgbClr val="434343"/>
-                </a:solidFill>
-              </a:rPr>
-              <a:t>Included_Packages - packages shipped with a product</a:t>
-            </a:r>
-            <a:endParaRPr>
-              <a:solidFill>
-                <a:srgbClr val="434343"/>
-              </a:solidFill>
-            </a:endParaRPr>
-          </a:p>
-          <a:p>
-            <a:pPr indent="-293211" lvl="1" marL="914400" rtl="0" algn="l">
-              <a:lnSpc>
-                <a:spcPct val="150000"/>
-              </a:lnSpc>
-              <a:spcBef>
-                <a:spcPts val="0"/>
-              </a:spcBef>
-              <a:spcAft>
-                <a:spcPts val="0"/>
-              </a:spcAft>
-              <a:buClr>
-                <a:srgbClr val="434343"/>
-              </a:buClr>
-              <a:buSzPct val="100000"/>
-              <a:buChar char="○"/>
-            </a:pPr>
-            <a:r>
-              <a:rPr lang="en">
-                <a:solidFill>
-                  <a:srgbClr val="434343"/>
-                </a:solidFill>
-              </a:rPr>
-              <a:t>Price (Rs.) - totl cost, downpayment or first installment</a:t>
-            </a:r>
-            <a:endParaRPr>
-              <a:solidFill>
-                <a:srgbClr val="434343"/>
-              </a:solidFill>
-            </a:endParaRPr>
-          </a:p>
-          <a:p>
-            <a:pPr indent="-293211" lvl="1" marL="914400" rtl="0" algn="l">
-              <a:lnSpc>
-                <a:spcPct val="150000"/>
-              </a:lnSpc>
-              <a:spcBef>
-                <a:spcPts val="0"/>
-              </a:spcBef>
-              <a:spcAft>
-                <a:spcPts val="0"/>
-              </a:spcAft>
-              <a:buClr>
-                <a:srgbClr val="434343"/>
-              </a:buClr>
-              <a:buSzPct val="100000"/>
-              <a:buChar char="○"/>
-            </a:pPr>
-            <a:r>
-              <a:rPr lang="en">
-                <a:solidFill>
-                  <a:srgbClr val="434343"/>
-                </a:solidFill>
-              </a:rPr>
-              <a:t>Monthly_Rental (Rs.)</a:t>
-            </a:r>
-            <a:endParaRPr>
-              <a:solidFill>
-                <a:srgbClr val="434343"/>
-              </a:solidFill>
-            </a:endParaRPr>
-          </a:p>
-          <a:p>
-            <a:pPr indent="-293211" lvl="1" marL="914400" rtl="0" algn="l">
-              <a:lnSpc>
-                <a:spcPct val="150000"/>
-              </a:lnSpc>
-              <a:spcBef>
-                <a:spcPts val="0"/>
-              </a:spcBef>
-              <a:spcAft>
-                <a:spcPts val="0"/>
-              </a:spcAft>
-              <a:buClr>
-                <a:srgbClr val="434343"/>
-              </a:buClr>
-              <a:buSzPct val="100000"/>
-              <a:buChar char="○"/>
-            </a:pPr>
-            <a:r>
-              <a:rPr lang="en">
-                <a:solidFill>
-                  <a:srgbClr val="434343"/>
-                </a:solidFill>
-              </a:rPr>
-              <a:t>Subscription_Type (SINGLE_PLAY/DOUBLE_PLAY/TRIPLE_PLAY)</a:t>
-            </a:r>
-            <a:endParaRPr>
-              <a:solidFill>
-                <a:srgbClr val="434343"/>
-              </a:solidFill>
-            </a:endParaRPr>
-          </a:p>
-          <a:p>
-            <a:pPr indent="-293211" lvl="1" marL="914400" rtl="0" algn="l">
-              <a:lnSpc>
-                <a:spcPct val="150000"/>
-              </a:lnSpc>
-              <a:spcBef>
-                <a:spcPts val="0"/>
-              </a:spcBef>
-              <a:spcAft>
-                <a:spcPts val="0"/>
-              </a:spcAft>
-              <a:buClr>
-                <a:srgbClr val="434343"/>
-              </a:buClr>
-              <a:buSzPct val="100000"/>
-              <a:buChar char="○"/>
-            </a:pPr>
-            <a:r>
-              <a:rPr lang="en">
-                <a:solidFill>
-                  <a:srgbClr val="434343"/>
-                </a:solidFill>
-              </a:rPr>
-              <a:t>Minimum_Subscription_Period (years)</a:t>
-            </a:r>
-            <a:endParaRPr>
-              <a:solidFill>
-                <a:srgbClr val="434343"/>
-              </a:solidFill>
-            </a:endParaRPr>
-          </a:p>
-          <a:p>
-            <a:pPr indent="-293211" lvl="1" marL="914400" rtl="0" algn="l">
-              <a:lnSpc>
-                <a:spcPct val="150000"/>
-              </a:lnSpc>
-              <a:spcBef>
-                <a:spcPts val="0"/>
-              </a:spcBef>
-              <a:spcAft>
-                <a:spcPts val="0"/>
-              </a:spcAft>
-              <a:buClr>
-                <a:srgbClr val="434343"/>
-              </a:buClr>
-              <a:buSzPct val="100000"/>
-              <a:buChar char="○"/>
-            </a:pPr>
-            <a:r>
-              <a:rPr lang="en">
-                <a:solidFill>
-                  <a:srgbClr val="434343"/>
-                </a:solidFill>
-              </a:rPr>
-              <a:t>Recidence_Type (Home/Office)</a:t>
-            </a:r>
-            <a:endParaRPr>
-              <a:solidFill>
-                <a:srgbClr val="434343"/>
-              </a:solidFill>
-            </a:endParaRPr>
-          </a:p>
-          <a:p>
-            <a:pPr indent="-293211" lvl="1" marL="914400" rtl="0" algn="l">
-              <a:lnSpc>
-                <a:spcPct val="150000"/>
-              </a:lnSpc>
-              <a:spcBef>
-                <a:spcPts val="0"/>
-              </a:spcBef>
-              <a:spcAft>
-                <a:spcPts val="0"/>
-              </a:spcAft>
-              <a:buClr>
-                <a:srgbClr val="434343"/>
-              </a:buClr>
-              <a:buSzPct val="100000"/>
-              <a:buChar char="○"/>
-            </a:pPr>
-            <a:r>
-              <a:rPr lang="en">
-                <a:solidFill>
-                  <a:srgbClr val="434343"/>
-                </a:solidFill>
-              </a:rPr>
-              <a:t>Tax_Status (INCLUDED/EXCLUDED)</a:t>
-            </a:r>
-            <a:endParaRPr>
-              <a:solidFill>
-                <a:srgbClr val="434343"/>
-              </a:solidFill>
-            </a:endParaRPr>
-          </a:p>
-          <a:p>
-            <a:pPr indent="-293211" lvl="1" marL="914400" rtl="0" algn="l">
-              <a:lnSpc>
-                <a:spcPct val="150000"/>
-              </a:lnSpc>
-              <a:spcBef>
-                <a:spcPts val="0"/>
-              </a:spcBef>
-              <a:spcAft>
-                <a:spcPts val="0"/>
-              </a:spcAft>
-              <a:buClr>
-                <a:srgbClr val="434343"/>
-              </a:buClr>
-              <a:buSzPct val="100000"/>
-              <a:buChar char="○"/>
-            </a:pPr>
-            <a:r>
-              <a:rPr lang="en">
-                <a:solidFill>
-                  <a:srgbClr val="434343"/>
-                </a:solidFill>
-              </a:rPr>
-              <a:t>Conditions - list of conditions for package</a:t>
-            </a:r>
-            <a:endParaRPr>
-              <a:solidFill>
-                <a:srgbClr val="434343"/>
-              </a:solidFill>
-            </a:endParaRPr>
-          </a:p>
-          <a:p>
-            <a:pPr indent="-293211" lvl="1" marL="914400" rtl="0" algn="l">
-              <a:lnSpc>
-                <a:spcPct val="150000"/>
-              </a:lnSpc>
-              <a:spcBef>
-                <a:spcPts val="0"/>
-              </a:spcBef>
-              <a:spcAft>
-                <a:spcPts val="0"/>
-              </a:spcAft>
-              <a:buClr>
-                <a:srgbClr val="434343"/>
-              </a:buClr>
-              <a:buSzPct val="100000"/>
-              <a:buChar char="○"/>
-            </a:pPr>
-            <a:r>
-              <a:rPr lang="en">
-                <a:solidFill>
-                  <a:srgbClr val="434343"/>
-                </a:solidFill>
-              </a:rPr>
-              <a:t>Available_Regions - list of available regions: MSAN or related level</a:t>
-            </a:r>
-            <a:endParaRPr>
-              <a:solidFill>
-                <a:srgbClr val="434343"/>
-              </a:solidFill>
-            </a:endParaRPr>
-          </a:p>
-          <a:p>
-            <a:pPr indent="-293211" lvl="1" marL="914400" rtl="0" algn="l">
-              <a:lnSpc>
-                <a:spcPct val="150000"/>
-              </a:lnSpc>
-              <a:spcBef>
-                <a:spcPts val="0"/>
-              </a:spcBef>
-              <a:spcAft>
-                <a:spcPts val="0"/>
-              </a:spcAft>
-              <a:buClr>
-                <a:srgbClr val="434343"/>
-              </a:buClr>
-              <a:buSzPct val="100000"/>
-              <a:buChar char="○"/>
-            </a:pPr>
-            <a:r>
-              <a:rPr lang="en">
-                <a:solidFill>
-                  <a:srgbClr val="434343"/>
-                </a:solidFill>
-              </a:rPr>
-              <a:t>Dependent_Packages (other products it depends on)</a:t>
-            </a:r>
-            <a:endParaRPr>
-              <a:solidFill>
-                <a:srgbClr val="434343"/>
-              </a:solidFill>
             </a:endParaRPr>
           </a:p>
         </p:txBody>
@@ -28742,7 +28637,11 @@
             </a:pPr>
             <a:r>
               <a:rPr lang="en"/>
-              <a:t>Product Profiles: Available features</a:t>
+              <a:t>Product</a:t>
+            </a:r>
+            <a:r>
+              <a:rPr lang="en"/>
+              <a:t> Profiles: Available features</a:t>
             </a:r>
             <a:endParaRPr/>
           </a:p>
@@ -28751,6 +28650,630 @@
       <p:sp>
         <p:nvSpPr>
           <p:cNvPr id="472" name="Google Shape;472;p64"/>
+          <p:cNvSpPr txBox="1"/>
+          <p:nvPr>
+            <p:ph idx="1" type="body"/>
+          </p:nvPr>
+        </p:nvSpPr>
+        <p:spPr>
+          <a:xfrm>
+            <a:off x="697250" y="1383875"/>
+            <a:ext cx="5143500" cy="3835800"/>
+          </a:xfrm>
+          <a:prstGeom prst="rect">
+            <a:avLst/>
+          </a:prstGeom>
+        </p:spPr>
+        <p:txBody>
+          <a:bodyPr anchorCtr="0" anchor="t" bIns="91425" lIns="91425" spcFirstLastPara="1" rIns="91425" wrap="square" tIns="91425">
+            <a:normAutofit fontScale="92500" lnSpcReduction="20000"/>
+          </a:bodyPr>
+          <a:lstStyle/>
+          <a:p>
+            <a:pPr indent="-304958" lvl="0" marL="457200" rtl="0" algn="l">
+              <a:lnSpc>
+                <a:spcPct val="150000"/>
+              </a:lnSpc>
+              <a:spcBef>
+                <a:spcPts val="0"/>
+              </a:spcBef>
+              <a:spcAft>
+                <a:spcPts val="0"/>
+              </a:spcAft>
+              <a:buClr>
+                <a:srgbClr val="434343"/>
+              </a:buClr>
+              <a:buSzPct val="100000"/>
+              <a:buChar char="●"/>
+            </a:pPr>
+            <a:r>
+              <a:rPr lang="en">
+                <a:solidFill>
+                  <a:srgbClr val="434343"/>
+                </a:solidFill>
+              </a:rPr>
+              <a:t>Common features</a:t>
+            </a:r>
+            <a:r>
+              <a:rPr lang="en">
+                <a:solidFill>
+                  <a:srgbClr val="434343"/>
+                </a:solidFill>
+              </a:rPr>
+              <a:t>:</a:t>
+            </a:r>
+            <a:endParaRPr>
+              <a:solidFill>
+                <a:srgbClr val="434343"/>
+              </a:solidFill>
+            </a:endParaRPr>
+          </a:p>
+          <a:p>
+            <a:pPr indent="-293211" lvl="1" marL="914400" rtl="0" algn="l">
+              <a:lnSpc>
+                <a:spcPct val="150000"/>
+              </a:lnSpc>
+              <a:spcBef>
+                <a:spcPts val="0"/>
+              </a:spcBef>
+              <a:spcAft>
+                <a:spcPts val="0"/>
+              </a:spcAft>
+              <a:buClr>
+                <a:srgbClr val="434343"/>
+              </a:buClr>
+              <a:buSzPct val="100000"/>
+              <a:buChar char="○"/>
+            </a:pPr>
+            <a:r>
+              <a:rPr lang="en">
+                <a:solidFill>
+                  <a:srgbClr val="434343"/>
+                </a:solidFill>
+              </a:rPr>
+              <a:t>Product_ID - product code</a:t>
+            </a:r>
+            <a:endParaRPr>
+              <a:solidFill>
+                <a:srgbClr val="434343"/>
+              </a:solidFill>
+            </a:endParaRPr>
+          </a:p>
+          <a:p>
+            <a:pPr indent="-293211" lvl="1" marL="914400" rtl="0" algn="l">
+              <a:lnSpc>
+                <a:spcPct val="150000"/>
+              </a:lnSpc>
+              <a:spcBef>
+                <a:spcPts val="0"/>
+              </a:spcBef>
+              <a:spcAft>
+                <a:spcPts val="0"/>
+              </a:spcAft>
+              <a:buClr>
+                <a:srgbClr val="434343"/>
+              </a:buClr>
+              <a:buSzPct val="100000"/>
+              <a:buChar char="○"/>
+            </a:pPr>
+            <a:r>
+              <a:rPr lang="en">
+                <a:solidFill>
+                  <a:srgbClr val="434343"/>
+                </a:solidFill>
+              </a:rPr>
+              <a:t>Base_Type (BB/VOICE/PEOTV)</a:t>
+            </a:r>
+            <a:endParaRPr>
+              <a:solidFill>
+                <a:srgbClr val="434343"/>
+              </a:solidFill>
+            </a:endParaRPr>
+          </a:p>
+          <a:p>
+            <a:pPr indent="-293211" lvl="1" marL="914400" rtl="0" algn="l">
+              <a:lnSpc>
+                <a:spcPct val="150000"/>
+              </a:lnSpc>
+              <a:spcBef>
+                <a:spcPts val="0"/>
+              </a:spcBef>
+              <a:spcAft>
+                <a:spcPts val="0"/>
+              </a:spcAft>
+              <a:buClr>
+                <a:srgbClr val="434343"/>
+              </a:buClr>
+              <a:buSzPct val="100000"/>
+              <a:buChar char="○"/>
+            </a:pPr>
+            <a:r>
+              <a:rPr lang="en">
+                <a:solidFill>
+                  <a:srgbClr val="434343"/>
+                </a:solidFill>
+              </a:rPr>
+              <a:t>Pricing_Type (PAID/FREE)</a:t>
+            </a:r>
+            <a:endParaRPr>
+              <a:solidFill>
+                <a:srgbClr val="434343"/>
+              </a:solidFill>
+            </a:endParaRPr>
+          </a:p>
+          <a:p>
+            <a:pPr indent="-293211" lvl="1" marL="914400" rtl="0" algn="l">
+              <a:lnSpc>
+                <a:spcPct val="150000"/>
+              </a:lnSpc>
+              <a:spcBef>
+                <a:spcPts val="0"/>
+              </a:spcBef>
+              <a:spcAft>
+                <a:spcPts val="0"/>
+              </a:spcAft>
+              <a:buClr>
+                <a:srgbClr val="434343"/>
+              </a:buClr>
+              <a:buSzPct val="100000"/>
+              <a:buChar char="○"/>
+            </a:pPr>
+            <a:r>
+              <a:rPr lang="en">
+                <a:solidFill>
+                  <a:srgbClr val="434343"/>
+                </a:solidFill>
+              </a:rPr>
+              <a:t>Package_Type (ADSL/Fibre/4G/Telephone/PeoTV)</a:t>
+            </a:r>
+            <a:endParaRPr>
+              <a:solidFill>
+                <a:srgbClr val="434343"/>
+              </a:solidFill>
+            </a:endParaRPr>
+          </a:p>
+          <a:p>
+            <a:pPr indent="-293211" lvl="1" marL="914400" rtl="0" algn="l">
+              <a:lnSpc>
+                <a:spcPct val="150000"/>
+              </a:lnSpc>
+              <a:spcBef>
+                <a:spcPts val="0"/>
+              </a:spcBef>
+              <a:spcAft>
+                <a:spcPts val="0"/>
+              </a:spcAft>
+              <a:buClr>
+                <a:srgbClr val="434343"/>
+              </a:buClr>
+              <a:buSzPct val="100000"/>
+              <a:buChar char="○"/>
+            </a:pPr>
+            <a:r>
+              <a:rPr lang="en">
+                <a:solidFill>
+                  <a:srgbClr val="434343"/>
+                </a:solidFill>
+              </a:rPr>
+              <a:t>VAS (YES/NO) - value added service</a:t>
+            </a:r>
+            <a:endParaRPr>
+              <a:solidFill>
+                <a:srgbClr val="434343"/>
+              </a:solidFill>
+            </a:endParaRPr>
+          </a:p>
+          <a:p>
+            <a:pPr indent="-293211" lvl="1" marL="914400" rtl="0" algn="l">
+              <a:lnSpc>
+                <a:spcPct val="150000"/>
+              </a:lnSpc>
+              <a:spcBef>
+                <a:spcPts val="0"/>
+              </a:spcBef>
+              <a:spcAft>
+                <a:spcPts val="0"/>
+              </a:spcAft>
+              <a:buClr>
+                <a:srgbClr val="434343"/>
+              </a:buClr>
+              <a:buSzPct val="100000"/>
+              <a:buChar char="○"/>
+            </a:pPr>
+            <a:r>
+              <a:rPr lang="en">
+                <a:solidFill>
+                  <a:srgbClr val="434343"/>
+                </a:solidFill>
+              </a:rPr>
+              <a:t>Title and Description</a:t>
+            </a:r>
+            <a:endParaRPr>
+              <a:solidFill>
+                <a:srgbClr val="434343"/>
+              </a:solidFill>
+            </a:endParaRPr>
+          </a:p>
+          <a:p>
+            <a:pPr indent="-293211" lvl="1" marL="914400" rtl="0" algn="l">
+              <a:lnSpc>
+                <a:spcPct val="150000"/>
+              </a:lnSpc>
+              <a:spcBef>
+                <a:spcPts val="0"/>
+              </a:spcBef>
+              <a:spcAft>
+                <a:spcPts val="0"/>
+              </a:spcAft>
+              <a:buClr>
+                <a:srgbClr val="434343"/>
+              </a:buClr>
+              <a:buSzPct val="100000"/>
+              <a:buChar char="○"/>
+            </a:pPr>
+            <a:r>
+              <a:rPr lang="en">
+                <a:solidFill>
+                  <a:srgbClr val="434343"/>
+                </a:solidFill>
+              </a:rPr>
+              <a:t>Included_Packages - packages shipped with a product</a:t>
+            </a:r>
+            <a:endParaRPr>
+              <a:solidFill>
+                <a:srgbClr val="434343"/>
+              </a:solidFill>
+            </a:endParaRPr>
+          </a:p>
+          <a:p>
+            <a:pPr indent="-293211" lvl="1" marL="914400" rtl="0" algn="l">
+              <a:lnSpc>
+                <a:spcPct val="150000"/>
+              </a:lnSpc>
+              <a:spcBef>
+                <a:spcPts val="0"/>
+              </a:spcBef>
+              <a:spcAft>
+                <a:spcPts val="0"/>
+              </a:spcAft>
+              <a:buClr>
+                <a:srgbClr val="434343"/>
+              </a:buClr>
+              <a:buSzPct val="100000"/>
+              <a:buChar char="○"/>
+            </a:pPr>
+            <a:r>
+              <a:rPr lang="en">
+                <a:solidFill>
+                  <a:srgbClr val="434343"/>
+                </a:solidFill>
+              </a:rPr>
+              <a:t>Price (Rs.) - total cost, down payment or first installment</a:t>
+            </a:r>
+            <a:endParaRPr>
+              <a:solidFill>
+                <a:srgbClr val="434343"/>
+              </a:solidFill>
+            </a:endParaRPr>
+          </a:p>
+          <a:p>
+            <a:pPr indent="-293211" lvl="1" marL="914400" rtl="0" algn="l">
+              <a:lnSpc>
+                <a:spcPct val="150000"/>
+              </a:lnSpc>
+              <a:spcBef>
+                <a:spcPts val="0"/>
+              </a:spcBef>
+              <a:spcAft>
+                <a:spcPts val="0"/>
+              </a:spcAft>
+              <a:buClr>
+                <a:srgbClr val="434343"/>
+              </a:buClr>
+              <a:buSzPct val="100000"/>
+              <a:buChar char="○"/>
+            </a:pPr>
+            <a:r>
+              <a:rPr lang="en">
+                <a:solidFill>
+                  <a:srgbClr val="434343"/>
+                </a:solidFill>
+              </a:rPr>
+              <a:t>Monthly_Rental (Rs.)</a:t>
+            </a:r>
+            <a:endParaRPr>
+              <a:solidFill>
+                <a:srgbClr val="434343"/>
+              </a:solidFill>
+            </a:endParaRPr>
+          </a:p>
+          <a:p>
+            <a:pPr indent="-293211" lvl="1" marL="914400" rtl="0" algn="l">
+              <a:lnSpc>
+                <a:spcPct val="150000"/>
+              </a:lnSpc>
+              <a:spcBef>
+                <a:spcPts val="0"/>
+              </a:spcBef>
+              <a:spcAft>
+                <a:spcPts val="0"/>
+              </a:spcAft>
+              <a:buClr>
+                <a:srgbClr val="434343"/>
+              </a:buClr>
+              <a:buSzPct val="100000"/>
+              <a:buChar char="○"/>
+            </a:pPr>
+            <a:r>
+              <a:rPr lang="en">
+                <a:solidFill>
+                  <a:srgbClr val="434343"/>
+                </a:solidFill>
+              </a:rPr>
+              <a:t>Subscription_Type (SINGLE_PLAY/DOUBLE_PLAY/TRIPLE_PLAY)</a:t>
+            </a:r>
+            <a:endParaRPr>
+              <a:solidFill>
+                <a:srgbClr val="434343"/>
+              </a:solidFill>
+            </a:endParaRPr>
+          </a:p>
+          <a:p>
+            <a:pPr indent="-293211" lvl="1" marL="914400" rtl="0" algn="l">
+              <a:lnSpc>
+                <a:spcPct val="150000"/>
+              </a:lnSpc>
+              <a:spcBef>
+                <a:spcPts val="0"/>
+              </a:spcBef>
+              <a:spcAft>
+                <a:spcPts val="0"/>
+              </a:spcAft>
+              <a:buClr>
+                <a:srgbClr val="434343"/>
+              </a:buClr>
+              <a:buSzPct val="100000"/>
+              <a:buChar char="○"/>
+            </a:pPr>
+            <a:r>
+              <a:rPr lang="en">
+                <a:solidFill>
+                  <a:srgbClr val="434343"/>
+                </a:solidFill>
+              </a:rPr>
+              <a:t>Minimum_Subscription_Period (years)</a:t>
+            </a:r>
+            <a:endParaRPr>
+              <a:solidFill>
+                <a:srgbClr val="434343"/>
+              </a:solidFill>
+            </a:endParaRPr>
+          </a:p>
+          <a:p>
+            <a:pPr indent="-293211" lvl="1" marL="914400" rtl="0" algn="l">
+              <a:lnSpc>
+                <a:spcPct val="150000"/>
+              </a:lnSpc>
+              <a:spcBef>
+                <a:spcPts val="0"/>
+              </a:spcBef>
+              <a:spcAft>
+                <a:spcPts val="0"/>
+              </a:spcAft>
+              <a:buClr>
+                <a:srgbClr val="434343"/>
+              </a:buClr>
+              <a:buSzPct val="100000"/>
+              <a:buChar char="○"/>
+            </a:pPr>
+            <a:r>
+              <a:rPr lang="en">
+                <a:solidFill>
+                  <a:srgbClr val="434343"/>
+                </a:solidFill>
+              </a:rPr>
+              <a:t>Recidence_Type (Home/Office)</a:t>
+            </a:r>
+            <a:endParaRPr>
+              <a:solidFill>
+                <a:srgbClr val="434343"/>
+              </a:solidFill>
+            </a:endParaRPr>
+          </a:p>
+          <a:p>
+            <a:pPr indent="-293211" lvl="1" marL="914400" rtl="0" algn="l">
+              <a:lnSpc>
+                <a:spcPct val="150000"/>
+              </a:lnSpc>
+              <a:spcBef>
+                <a:spcPts val="0"/>
+              </a:spcBef>
+              <a:spcAft>
+                <a:spcPts val="0"/>
+              </a:spcAft>
+              <a:buClr>
+                <a:srgbClr val="434343"/>
+              </a:buClr>
+              <a:buSzPct val="100000"/>
+              <a:buChar char="○"/>
+            </a:pPr>
+            <a:r>
+              <a:rPr lang="en">
+                <a:solidFill>
+                  <a:srgbClr val="434343"/>
+                </a:solidFill>
+              </a:rPr>
+              <a:t>Tax_Status (INCLUDED/EXCLUDED)</a:t>
+            </a:r>
+            <a:endParaRPr>
+              <a:solidFill>
+                <a:srgbClr val="434343"/>
+              </a:solidFill>
+            </a:endParaRPr>
+          </a:p>
+          <a:p>
+            <a:pPr indent="-293211" lvl="1" marL="914400" rtl="0" algn="l">
+              <a:lnSpc>
+                <a:spcPct val="150000"/>
+              </a:lnSpc>
+              <a:spcBef>
+                <a:spcPts val="0"/>
+              </a:spcBef>
+              <a:spcAft>
+                <a:spcPts val="0"/>
+              </a:spcAft>
+              <a:buClr>
+                <a:srgbClr val="434343"/>
+              </a:buClr>
+              <a:buSzPct val="100000"/>
+              <a:buChar char="○"/>
+            </a:pPr>
+            <a:r>
+              <a:rPr lang="en">
+                <a:solidFill>
+                  <a:srgbClr val="434343"/>
+                </a:solidFill>
+              </a:rPr>
+              <a:t>Conditions - list of conditions for package</a:t>
+            </a:r>
+            <a:endParaRPr>
+              <a:solidFill>
+                <a:srgbClr val="434343"/>
+              </a:solidFill>
+            </a:endParaRPr>
+          </a:p>
+          <a:p>
+            <a:pPr indent="-293211" lvl="1" marL="914400" rtl="0" algn="l">
+              <a:lnSpc>
+                <a:spcPct val="150000"/>
+              </a:lnSpc>
+              <a:spcBef>
+                <a:spcPts val="0"/>
+              </a:spcBef>
+              <a:spcAft>
+                <a:spcPts val="0"/>
+              </a:spcAft>
+              <a:buClr>
+                <a:srgbClr val="434343"/>
+              </a:buClr>
+              <a:buSzPct val="100000"/>
+              <a:buChar char="○"/>
+            </a:pPr>
+            <a:r>
+              <a:rPr lang="en">
+                <a:solidFill>
+                  <a:srgbClr val="434343"/>
+                </a:solidFill>
+              </a:rPr>
+              <a:t>Available_Regions - list of available regions: MSAN or related level</a:t>
+            </a:r>
+            <a:endParaRPr>
+              <a:solidFill>
+                <a:srgbClr val="434343"/>
+              </a:solidFill>
+            </a:endParaRPr>
+          </a:p>
+          <a:p>
+            <a:pPr indent="-293211" lvl="1" marL="914400" rtl="0" algn="l">
+              <a:lnSpc>
+                <a:spcPct val="150000"/>
+              </a:lnSpc>
+              <a:spcBef>
+                <a:spcPts val="0"/>
+              </a:spcBef>
+              <a:spcAft>
+                <a:spcPts val="0"/>
+              </a:spcAft>
+              <a:buClr>
+                <a:srgbClr val="434343"/>
+              </a:buClr>
+              <a:buSzPct val="100000"/>
+              <a:buChar char="○"/>
+            </a:pPr>
+            <a:r>
+              <a:rPr lang="en">
+                <a:solidFill>
+                  <a:srgbClr val="434343"/>
+                </a:solidFill>
+              </a:rPr>
+              <a:t>Dependent_Packages (other products it depends on)</a:t>
+            </a:r>
+            <a:endParaRPr>
+              <a:solidFill>
+                <a:srgbClr val="434343"/>
+              </a:solidFill>
+            </a:endParaRPr>
+          </a:p>
+        </p:txBody>
+      </p:sp>
+    </p:spTree>
+  </p:cSld>
+  <p:clrMapOvr>
+    <a:masterClrMapping/>
+  </p:clrMapOvr>
+</p:sld>
+</file>
+
+<file path=ppt/slides/slide53.xml><?xml version="1.0" encoding="utf-8"?>
+<p:sld xmlns:a="http://schemas.openxmlformats.org/drawingml/2006/main" xmlns:r="http://schemas.openxmlformats.org/officeDocument/2006/relationships" xmlns:mc="http://schemas.openxmlformats.org/markup-compatibility/2006" xmlns:mv="urn:schemas-microsoft-com:mac:vml" xmlns:p="http://schemas.openxmlformats.org/presentationml/2006/main" xmlns:c="http://schemas.openxmlformats.org/drawingml/2006/chart" xmlns:dgm="http://schemas.openxmlformats.org/drawingml/2006/diagram" xmlns:o="urn:schemas-microsoft-com:office:office" xmlns:v="urn:schemas-microsoft-com:vml" xmlns:pvml="urn:schemas-microsoft-com:office:powerpoint" xmlns:com="http://schemas.openxmlformats.org/drawingml/2006/compatibility" xmlns:p14="http://schemas.microsoft.com/office/powerpoint/2010/main" xmlns:p15="http://schemas.microsoft.com/office/powerpoint/2012/main" xmlns:ahyp="http://schemas.microsoft.com/office/drawing/2018/hyperlinkcolor">
+  <p:cSld>
+    <p:spTree>
+      <p:nvGrpSpPr>
+        <p:cNvPr id="476" name="Shape 476"/>
+        <p:cNvGrpSpPr/>
+        <p:nvPr/>
+      </p:nvGrpSpPr>
+      <p:grpSpPr>
+        <a:xfrm>
+          <a:off x="0" y="0"/>
+          <a:ext cx="0" cy="0"/>
+          <a:chOff x="0" y="0"/>
+          <a:chExt cx="0" cy="0"/>
+        </a:xfrm>
+      </p:grpSpPr>
+      <p:sp>
+        <p:nvSpPr>
+          <p:cNvPr id="477" name="Google Shape;477;p65"/>
+          <p:cNvSpPr txBox="1"/>
+          <p:nvPr>
+            <p:ph type="title"/>
+          </p:nvPr>
+        </p:nvSpPr>
+        <p:spPr>
+          <a:xfrm>
+            <a:off x="727650" y="599950"/>
+            <a:ext cx="7688700" cy="535200"/>
+          </a:xfrm>
+          <a:prstGeom prst="rect">
+            <a:avLst/>
+          </a:prstGeom>
+        </p:spPr>
+        <p:txBody>
+          <a:bodyPr anchorCtr="0" anchor="t" bIns="91425" lIns="91425" spcFirstLastPara="1" rIns="91425" wrap="square" tIns="91425">
+            <a:normAutofit fontScale="90000"/>
+          </a:bodyPr>
+          <a:lstStyle/>
+          <a:p>
+            <a:pPr indent="0" lvl="0" marL="0" rtl="0" algn="l">
+              <a:spcBef>
+                <a:spcPts val="0"/>
+              </a:spcBef>
+              <a:spcAft>
+                <a:spcPts val="0"/>
+              </a:spcAft>
+              <a:buNone/>
+            </a:pPr>
+            <a:r>
+              <a:rPr lang="en"/>
+              <a:t>Product Profiles: Available features</a:t>
+            </a:r>
+            <a:endParaRPr/>
+          </a:p>
+        </p:txBody>
+      </p:sp>
+      <p:sp>
+        <p:nvSpPr>
+          <p:cNvPr id="478" name="Google Shape;478;p65"/>
           <p:cNvSpPr txBox="1"/>
           <p:nvPr>
             <p:ph idx="1" type="body"/>
@@ -29246,7 +29769,7 @@
       </p:sp>
       <p:sp>
         <p:nvSpPr>
-          <p:cNvPr id="473" name="Google Shape;473;p64"/>
+          <p:cNvPr id="479" name="Google Shape;479;p65"/>
           <p:cNvSpPr txBox="1"/>
           <p:nvPr>
             <p:ph idx="1" type="body"/>
@@ -29353,99 +29876,6 @@
           </a:p>
         </p:txBody>
       </p:sp>
-    </p:spTree>
-  </p:cSld>
-  <p:clrMapOvr>
-    <a:masterClrMapping/>
-  </p:clrMapOvr>
-</p:sld>
-</file>
-
-<file path=ppt/slides/slide53.xml><?xml version="1.0" encoding="utf-8"?>
-<p:sld xmlns:a="http://schemas.openxmlformats.org/drawingml/2006/main" xmlns:r="http://schemas.openxmlformats.org/officeDocument/2006/relationships" xmlns:mc="http://schemas.openxmlformats.org/markup-compatibility/2006" xmlns:mv="urn:schemas-microsoft-com:mac:vml" xmlns:p="http://schemas.openxmlformats.org/presentationml/2006/main" xmlns:c="http://schemas.openxmlformats.org/drawingml/2006/chart" xmlns:dgm="http://schemas.openxmlformats.org/drawingml/2006/diagram" xmlns:o="urn:schemas-microsoft-com:office:office" xmlns:v="urn:schemas-microsoft-com:vml" xmlns:pvml="urn:schemas-microsoft-com:office:powerpoint" xmlns:com="http://schemas.openxmlformats.org/drawingml/2006/compatibility" xmlns:p14="http://schemas.microsoft.com/office/powerpoint/2010/main" xmlns:p15="http://schemas.microsoft.com/office/powerpoint/2012/main" xmlns:ahyp="http://schemas.microsoft.com/office/drawing/2018/hyperlinkcolor">
-  <p:cSld>
-    <p:spTree>
-      <p:nvGrpSpPr>
-        <p:cNvPr id="477" name="Shape 477"/>
-        <p:cNvGrpSpPr/>
-        <p:nvPr/>
-      </p:nvGrpSpPr>
-      <p:grpSpPr>
-        <a:xfrm>
-          <a:off x="0" y="0"/>
-          <a:ext cx="0" cy="0"/>
-          <a:chOff x="0" y="0"/>
-          <a:chExt cx="0" cy="0"/>
-        </a:xfrm>
-      </p:grpSpPr>
-      <p:sp>
-        <p:nvSpPr>
-          <p:cNvPr id="478" name="Google Shape;478;p65"/>
-          <p:cNvSpPr txBox="1"/>
-          <p:nvPr>
-            <p:ph type="title"/>
-          </p:nvPr>
-        </p:nvSpPr>
-        <p:spPr>
-          <a:xfrm>
-            <a:off x="727650" y="599950"/>
-            <a:ext cx="7688700" cy="535200"/>
-          </a:xfrm>
-          <a:prstGeom prst="rect">
-            <a:avLst/>
-          </a:prstGeom>
-        </p:spPr>
-        <p:txBody>
-          <a:bodyPr anchorCtr="0" anchor="t" bIns="91425" lIns="91425" spcFirstLastPara="1" rIns="91425" wrap="square" tIns="91425">
-            <a:normAutofit fontScale="90000"/>
-          </a:bodyPr>
-          <a:lstStyle/>
-          <a:p>
-            <a:pPr indent="0" lvl="0" marL="0" rtl="0" algn="l">
-              <a:spcBef>
-                <a:spcPts val="0"/>
-              </a:spcBef>
-              <a:spcAft>
-                <a:spcPts val="0"/>
-              </a:spcAft>
-              <a:buNone/>
-            </a:pPr>
-            <a:r>
-              <a:rPr lang="en"/>
-              <a:t>Product Profiles</a:t>
-            </a:r>
-            <a:endParaRPr/>
-          </a:p>
-        </p:txBody>
-      </p:sp>
-      <p:pic>
-        <p:nvPicPr>
-          <p:cNvPr id="479" name="Google Shape;479;p65"/>
-          <p:cNvPicPr preferRelativeResize="0"/>
-          <p:nvPr/>
-        </p:nvPicPr>
-        <p:blipFill>
-          <a:blip r:embed="rId3">
-            <a:alphaModFix/>
-          </a:blip>
-          <a:stretch>
-            <a:fillRect/>
-          </a:stretch>
-        </p:blipFill>
-        <p:spPr>
-          <a:xfrm>
-            <a:off x="1783600" y="1358100"/>
-            <a:ext cx="6017851" cy="3607651"/>
-          </a:xfrm>
-          <a:prstGeom prst="rect">
-            <a:avLst/>
-          </a:prstGeom>
-          <a:noFill/>
-          <a:ln>
-            <a:noFill/>
-          </a:ln>
-        </p:spPr>
-      </p:pic>
     </p:spTree>
   </p:cSld>
   <p:clrMapOvr>
@@ -29481,6 +29911,99 @@
         </p:nvSpPr>
         <p:spPr>
           <a:xfrm>
+            <a:off x="727650" y="599950"/>
+            <a:ext cx="7688700" cy="535200"/>
+          </a:xfrm>
+          <a:prstGeom prst="rect">
+            <a:avLst/>
+          </a:prstGeom>
+        </p:spPr>
+        <p:txBody>
+          <a:bodyPr anchorCtr="0" anchor="t" bIns="91425" lIns="91425" spcFirstLastPara="1" rIns="91425" wrap="square" tIns="91425">
+            <a:normAutofit fontScale="90000"/>
+          </a:bodyPr>
+          <a:lstStyle/>
+          <a:p>
+            <a:pPr indent="0" lvl="0" marL="0" rtl="0" algn="l">
+              <a:spcBef>
+                <a:spcPts val="0"/>
+              </a:spcBef>
+              <a:spcAft>
+                <a:spcPts val="0"/>
+              </a:spcAft>
+              <a:buNone/>
+            </a:pPr>
+            <a:r>
+              <a:rPr lang="en"/>
+              <a:t>Product Profiles</a:t>
+            </a:r>
+            <a:endParaRPr/>
+          </a:p>
+        </p:txBody>
+      </p:sp>
+      <p:pic>
+        <p:nvPicPr>
+          <p:cNvPr id="485" name="Google Shape;485;p66"/>
+          <p:cNvPicPr preferRelativeResize="0"/>
+          <p:nvPr/>
+        </p:nvPicPr>
+        <p:blipFill>
+          <a:blip r:embed="rId3">
+            <a:alphaModFix/>
+          </a:blip>
+          <a:stretch>
+            <a:fillRect/>
+          </a:stretch>
+        </p:blipFill>
+        <p:spPr>
+          <a:xfrm>
+            <a:off x="1783600" y="1358100"/>
+            <a:ext cx="6017851" cy="3607651"/>
+          </a:xfrm>
+          <a:prstGeom prst="rect">
+            <a:avLst/>
+          </a:prstGeom>
+          <a:noFill/>
+          <a:ln>
+            <a:noFill/>
+          </a:ln>
+        </p:spPr>
+      </p:pic>
+    </p:spTree>
+  </p:cSld>
+  <p:clrMapOvr>
+    <a:masterClrMapping/>
+  </p:clrMapOvr>
+</p:sld>
+</file>
+
+<file path=ppt/slides/slide55.xml><?xml version="1.0" encoding="utf-8"?>
+<p:sld xmlns:a="http://schemas.openxmlformats.org/drawingml/2006/main" xmlns:r="http://schemas.openxmlformats.org/officeDocument/2006/relationships" xmlns:mc="http://schemas.openxmlformats.org/markup-compatibility/2006" xmlns:mv="urn:schemas-microsoft-com:mac:vml" xmlns:p="http://schemas.openxmlformats.org/presentationml/2006/main" xmlns:c="http://schemas.openxmlformats.org/drawingml/2006/chart" xmlns:dgm="http://schemas.openxmlformats.org/drawingml/2006/diagram" xmlns:o="urn:schemas-microsoft-com:office:office" xmlns:v="urn:schemas-microsoft-com:vml" xmlns:pvml="urn:schemas-microsoft-com:office:powerpoint" xmlns:com="http://schemas.openxmlformats.org/drawingml/2006/compatibility" xmlns:p14="http://schemas.microsoft.com/office/powerpoint/2010/main" xmlns:p15="http://schemas.microsoft.com/office/powerpoint/2012/main" xmlns:ahyp="http://schemas.microsoft.com/office/drawing/2018/hyperlinkcolor">
+  <p:cSld>
+    <p:spTree>
+      <p:nvGrpSpPr>
+        <p:cNvPr id="489" name="Shape 489"/>
+        <p:cNvGrpSpPr/>
+        <p:nvPr/>
+      </p:nvGrpSpPr>
+      <p:grpSpPr>
+        <a:xfrm>
+          <a:off x="0" y="0"/>
+          <a:ext cx="0" cy="0"/>
+          <a:chOff x="0" y="0"/>
+          <a:chExt cx="0" cy="0"/>
+        </a:xfrm>
+      </p:grpSpPr>
+      <p:sp>
+        <p:nvSpPr>
+          <p:cNvPr id="490" name="Google Shape;490;p67"/>
+          <p:cNvSpPr txBox="1"/>
+          <p:nvPr>
+            <p:ph type="title"/>
+          </p:nvPr>
+        </p:nvSpPr>
+        <p:spPr>
+          <a:xfrm>
             <a:off x="730000" y="1318650"/>
             <a:ext cx="3634200" cy="1687200"/>
           </a:xfrm>
@@ -29513,7 +30036,7 @@
       </p:sp>
       <p:sp>
         <p:nvSpPr>
-          <p:cNvPr id="485" name="Google Shape;485;p66"/>
+          <p:cNvPr id="491" name="Google Shape;491;p67"/>
           <p:cNvSpPr txBox="1"/>
           <p:nvPr>
             <p:ph idx="2" type="body"/>
@@ -29552,7 +30075,7 @@
       </p:sp>
       <p:sp>
         <p:nvSpPr>
-          <p:cNvPr id="486" name="Google Shape;486;p66"/>
+          <p:cNvPr id="492" name="Google Shape;492;p67"/>
           <p:cNvSpPr txBox="1"/>
           <p:nvPr>
             <p:ph idx="1" type="subTitle"/>
@@ -29591,7 +30114,7 @@
       </p:sp>
       <p:pic>
         <p:nvPicPr>
-          <p:cNvPr id="487" name="Google Shape;487;p66"/>
+          <p:cNvPr id="493" name="Google Shape;493;p67"/>
           <p:cNvPicPr preferRelativeResize="0"/>
           <p:nvPr/>
         </p:nvPicPr>
@@ -29624,12 +30147,12 @@
 </p:sld>
 </file>
 
-<file path=ppt/slides/slide55.xml><?xml version="1.0" encoding="utf-8"?>
+<file path=ppt/slides/slide56.xml><?xml version="1.0" encoding="utf-8"?>
 <p:sld xmlns:a="http://schemas.openxmlformats.org/drawingml/2006/main" xmlns:r="http://schemas.openxmlformats.org/officeDocument/2006/relationships" xmlns:mc="http://schemas.openxmlformats.org/markup-compatibility/2006" xmlns:mv="urn:schemas-microsoft-com:mac:vml" xmlns:p="http://schemas.openxmlformats.org/presentationml/2006/main" xmlns:c="http://schemas.openxmlformats.org/drawingml/2006/chart" xmlns:dgm="http://schemas.openxmlformats.org/drawingml/2006/diagram" xmlns:o="urn:schemas-microsoft-com:office:office" xmlns:v="urn:schemas-microsoft-com:vml" xmlns:pvml="urn:schemas-microsoft-com:office:powerpoint" xmlns:com="http://schemas.openxmlformats.org/drawingml/2006/compatibility" xmlns:p14="http://schemas.microsoft.com/office/powerpoint/2010/main" xmlns:p15="http://schemas.microsoft.com/office/powerpoint/2012/main" xmlns:ahyp="http://schemas.microsoft.com/office/drawing/2018/hyperlinkcolor">
   <p:cSld>
     <p:spTree>
       <p:nvGrpSpPr>
-        <p:cNvPr id="491" name="Shape 491"/>
+        <p:cNvPr id="497" name="Shape 497"/>
         <p:cNvGrpSpPr/>
         <p:nvPr/>
       </p:nvGrpSpPr>
@@ -29643,7 +30166,7 @@
       </p:grpSpPr>
       <p:sp>
         <p:nvSpPr>
-          <p:cNvPr id="492" name="Google Shape;492;p67"/>
+          <p:cNvPr id="498" name="Google Shape;498;p68"/>
           <p:cNvSpPr txBox="1"/>
           <p:nvPr>
             <p:ph type="title"/>
@@ -29834,9 +30357,25 @@
                   <a:srgbClr val="434343"/>
                 </a:solidFill>
               </a:rPr>
-              <a:t>Bin ranges selected considering skewness of data distribution</a:t>
-            </a:r>
-            <a:endParaRPr>
+              <a:t>Bin ranges selected considering skewness of data distribution </a:t>
+            </a:r>
+            <a:r>
+              <a:rPr b="1" lang="en">
+                <a:solidFill>
+                  <a:srgbClr val="434343"/>
+                </a:solidFill>
+              </a:rPr>
+              <a:t> </a:t>
+            </a:r>
+            <a:r>
+              <a:rPr lang="en">
+                <a:solidFill>
+                  <a:srgbClr val="434343"/>
+                </a:solidFill>
+              </a:rPr>
+              <a:t>(25,50,75th precentiles)</a:t>
+            </a:r>
+            <a:endParaRPr b="1">
               <a:solidFill>
                 <a:srgbClr val="434343"/>
               </a:solidFill>
@@ -29860,14 +30399,52 @@
               <a:buChar char="○"/>
             </a:pPr>
             <a:r>
-              <a:rPr b="1" lang="en">
-                <a:solidFill>
-                  <a:srgbClr val="434343"/>
-                </a:solidFill>
-              </a:rPr>
-              <a:t>Freedman-Diaconis’s Rule based approach (Using Interquartile range)</a:t>
-            </a:r>
-            <a:endParaRPr b="1">
+              <a:rPr lang="en">
+                <a:solidFill>
+                  <a:srgbClr val="434343"/>
+                </a:solidFill>
+              </a:rPr>
+              <a:t>Ex: For ONNET INCOMING Data : [0, 6,15, 30, 100,1200,2400,4800,6890]</a:t>
+            </a:r>
+            <a:br>
+              <a:rPr lang="en">
+                <a:solidFill>
+                  <a:srgbClr val="434343"/>
+                </a:solidFill>
+              </a:rPr>
+            </a:br>
+            <a:endParaRPr>
+              <a:solidFill>
+                <a:srgbClr val="434343"/>
+              </a:solidFill>
+            </a:endParaRPr>
+          </a:p>
+          <a:p>
+            <a:pPr indent="-311150" lvl="0" marL="457200" rtl="0" algn="l">
+              <a:lnSpc>
+                <a:spcPct val="150000"/>
+              </a:lnSpc>
+              <a:spcBef>
+                <a:spcPts val="0"/>
+              </a:spcBef>
+              <a:spcAft>
+                <a:spcPts val="0"/>
+              </a:spcAft>
+              <a:buClr>
+                <a:srgbClr val="434343"/>
+              </a:buClr>
+              <a:buSzPts val="1300"/>
+              <a:buChar char="●"/>
+            </a:pPr>
+            <a:r>
+              <a:rPr lang="en">
+                <a:solidFill>
+                  <a:srgbClr val="434343"/>
+                </a:solidFill>
+              </a:rPr>
+              <a:t>Bined Call Duration - 8 Bins</a:t>
+            </a:r>
+            <a:endParaRPr>
               <a:solidFill>
                 <a:srgbClr val="434343"/>
               </a:solidFill>
@@ -29896,109 +30473,9 @@
                   <a:srgbClr val="434343"/>
                 </a:solidFill>
               </a:rPr>
-              <a:t>Ex: For ONNET INCOMING Data : [0, 6,15, 30, 100,1200,2400,4800,6890]</a:t>
-            </a:r>
-            <a:br>
-              <a:rPr lang="en">
-                <a:solidFill>
-                  <a:srgbClr val="434343"/>
-                </a:solidFill>
-              </a:rPr>
-            </a:br>
+              <a:t>Bin ranges selected considering skewness of data distribution (25,50,75th precentiles)</a:t>
+            </a:r>
             <a:endParaRPr>
-              <a:solidFill>
-                <a:srgbClr val="434343"/>
-              </a:solidFill>
-            </a:endParaRPr>
-          </a:p>
-          <a:p>
-            <a:pPr indent="-311150" lvl="0" marL="457200" rtl="0" algn="l">
-              <a:lnSpc>
-                <a:spcPct val="150000"/>
-              </a:lnSpc>
-              <a:spcBef>
-                <a:spcPts val="0"/>
-              </a:spcBef>
-              <a:spcAft>
-                <a:spcPts val="0"/>
-              </a:spcAft>
-              <a:buClr>
-                <a:srgbClr val="434343"/>
-              </a:buClr>
-              <a:buSzPts val="1300"/>
-              <a:buChar char="●"/>
-            </a:pPr>
-            <a:r>
-              <a:rPr lang="en">
-                <a:solidFill>
-                  <a:srgbClr val="434343"/>
-                </a:solidFill>
-              </a:rPr>
-              <a:t>Bined Call Duration - 8 Bins</a:t>
-            </a:r>
-            <a:endParaRPr>
-              <a:solidFill>
-                <a:srgbClr val="434343"/>
-              </a:solidFill>
-            </a:endParaRPr>
-          </a:p>
-          <a:p>
-            <a:pPr indent="-298450" lvl="1" marL="914400" rtl="0" algn="l">
-              <a:lnSpc>
-                <a:spcPct val="150000"/>
-              </a:lnSpc>
-              <a:spcBef>
-                <a:spcPts val="0"/>
-              </a:spcBef>
-              <a:spcAft>
-                <a:spcPts val="0"/>
-              </a:spcAft>
-              <a:buClr>
-                <a:srgbClr val="434343"/>
-              </a:buClr>
-              <a:buSzPts val="1100"/>
-              <a:buChar char="○"/>
-            </a:pPr>
-            <a:r>
-              <a:rPr lang="en">
-                <a:solidFill>
-                  <a:srgbClr val="434343"/>
-                </a:solidFill>
-              </a:rPr>
-              <a:t>Bin ranges selected considering skewness of data distribution</a:t>
-            </a:r>
-            <a:endParaRPr>
-              <a:solidFill>
-                <a:srgbClr val="434343"/>
-              </a:solidFill>
-            </a:endParaRPr>
-          </a:p>
-          <a:p>
-            <a:pPr indent="-298450" lvl="1" marL="914400" rtl="0" algn="l">
-              <a:lnSpc>
-                <a:spcPct val="150000"/>
-              </a:lnSpc>
-              <a:spcBef>
-                <a:spcPts val="0"/>
-              </a:spcBef>
-              <a:spcAft>
-                <a:spcPts val="0"/>
-              </a:spcAft>
-              <a:buClr>
-                <a:srgbClr val="434343"/>
-              </a:buClr>
-              <a:buSzPts val="1100"/>
-              <a:buChar char="○"/>
-            </a:pPr>
-            <a:r>
-              <a:rPr b="1" lang="en">
-                <a:solidFill>
-                  <a:srgbClr val="434343"/>
-                </a:solidFill>
-              </a:rPr>
-              <a:t>Freedman-Diaconis’s Rule based approach (Using Interquartile range)</a:t>
-            </a:r>
-            <a:endParaRPr b="1">
               <a:solidFill>
                 <a:srgbClr val="434343"/>
               </a:solidFill>
@@ -30076,8 +30553,8 @@
         </p:nvSpPr>
         <p:spPr>
           <a:xfrm>
-            <a:off x="710550" y="4082525"/>
-            <a:ext cx="7153500" cy="1046700"/>
+            <a:off x="1167750" y="3853925"/>
+            <a:ext cx="6318000" cy="1185300"/>
           </a:xfrm>
           <a:prstGeom prst="rect">
             <a:avLst/>
@@ -31728,6 +32205,285 @@
 </file>
 
 <file path=ppt/theme/theme1.xml><?xml version="1.0" encoding="utf-8"?>
+<a:theme xmlns:a="http://schemas.openxmlformats.org/drawingml/2006/main" xmlns:r="http://schemas.openxmlformats.org/officeDocument/2006/relationships">
+  <a:themeElements>
+    <a:clrScheme name="Default">
+      <a:dk1>
+        <a:srgbClr val="000000"/>
+      </a:dk1>
+      <a:lt1>
+        <a:srgbClr val="FFFFFF"/>
+      </a:lt1>
+      <a:dk2>
+        <a:srgbClr val="158158"/>
+      </a:dk2>
+      <a:lt2>
+        <a:srgbClr val="F3F3F3"/>
+      </a:lt2>
+      <a:accent1>
+        <a:srgbClr val="058DC7"/>
+      </a:accent1>
+      <a:accent2>
+        <a:srgbClr val="50B432"/>
+      </a:accent2>
+      <a:accent3>
+        <a:srgbClr val="ED561B"/>
+      </a:accent3>
+      <a:accent4>
+        <a:srgbClr val="EDEF00"/>
+      </a:accent4>
+      <a:accent5>
+        <a:srgbClr val="24CBE5"/>
+      </a:accent5>
+      <a:accent6>
+        <a:srgbClr val="64E572"/>
+      </a:accent6>
+      <a:hlink>
+        <a:srgbClr val="2200CC"/>
+      </a:hlink>
+      <a:folHlink>
+        <a:srgbClr val="551A8B"/>
+      </a:folHlink>
+    </a:clrScheme>
+    <a:fontScheme name="Office">
+      <a:majorFont>
+        <a:latin typeface="Arial"/>
+        <a:ea typeface=""/>
+        <a:cs typeface=""/>
+        <a:font script="Jpan" typeface="ＭＳ Ｐゴシック"/>
+        <a:font script="Hang" typeface="맑은 고딕"/>
+        <a:font script="Hans" typeface="宋体"/>
+        <a:font script="Hant" typeface="新細明體"/>
+        <a:font script="Arab" typeface="Times New Roman"/>
+        <a:font script="Hebr" typeface="Times New Roman"/>
+        <a:font script="Thai" typeface="Angsana New"/>
+        <a:font script="Ethi" typeface="Nyala"/>
+        <a:font script="Beng" typeface="Vrinda"/>
+        <a:font script="Gujr" typeface="Shruti"/>
+        <a:font script="Khmr" typeface="MoolBoran"/>
+        <a:font script="Knda" typeface="Tunga"/>
+        <a:font script="Guru" typeface="Raavi"/>
+        <a:font script="Cans" typeface="Euphemia"/>
+        <a:font script="Cher" typeface="Plantagenet Cherokee"/>
+        <a:font script="Yiii" typeface="Microsoft Yi Baiti"/>
+        <a:font script="Tibt" typeface="Microsoft Himalaya"/>
+        <a:font script="Thaa" typeface="MV Boli"/>
+        <a:font script="Deva" typeface="Mangal"/>
+        <a:font script="Telu" typeface="Gautami"/>
+        <a:font script="Taml" typeface="Latha"/>
+        <a:font script="Syrc" typeface="Estrangelo Edessa"/>
+        <a:font script="Orya" typeface="Kalinga"/>
+        <a:font script="Mlym" typeface="Kartika"/>
+        <a:font script="Laoo" typeface="DokChampa"/>
+        <a:font script="Sinh" typeface="Iskoola Pota"/>
+        <a:font script="Mong" typeface="Mongolian Baiti"/>
+        <a:font script="Viet" typeface="Times New Roman"/>
+        <a:font script="Uigh" typeface="Microsoft Uighur"/>
+        <a:font script="Geor" typeface="Sylfaen"/>
+      </a:majorFont>
+      <a:minorFont>
+        <a:latin typeface="Arial"/>
+        <a:ea typeface=""/>
+        <a:cs typeface=""/>
+        <a:font script="Jpan" typeface="ＭＳ Ｐゴシック"/>
+        <a:font script="Hang" typeface="맑은 고딕"/>
+        <a:font script="Hans" typeface="宋体"/>
+        <a:font script="Hant" typeface="新細明體"/>
+        <a:font script="Arab" typeface="Arial"/>
+        <a:font script="Hebr" typeface="Arial"/>
+        <a:font script="Thai" typeface="Cordia New"/>
+        <a:font script="Ethi" typeface="Nyala"/>
+        <a:font script="Beng" typeface="Vrinda"/>
+        <a:font script="Gujr" typeface="Shruti"/>
+        <a:font script="Khmr" typeface="DaunPenh"/>
+        <a:font script="Knda" typeface="Tunga"/>
+        <a:font script="Guru" typeface="Raavi"/>
+        <a:font script="Cans" typeface="Euphemia"/>
+        <a:font script="Cher" typeface="Plantagenet Cherokee"/>
+        <a:font script="Yiii" typeface="Microsoft Yi Baiti"/>
+        <a:font script="Tibt" typeface="Microsoft Himalaya"/>
+        <a:font script="Thaa" typeface="MV Boli"/>
+        <a:font script="Deva" typeface="Mangal"/>
+        <a:font script="Telu" typeface="Gautami"/>
+        <a:font script="Taml" typeface="Latha"/>
+        <a:font script="Syrc" typeface="Estrangelo Edessa"/>
+        <a:font script="Orya" typeface="Kalinga"/>
+        <a:font script="Mlym" typeface="Kartika"/>
+        <a:font script="Laoo" typeface="DokChampa"/>
+        <a:font script="Sinh" typeface="Iskoola Pota"/>
+        <a:font script="Mong" typeface="Mongolian Baiti"/>
+        <a:font script="Viet" typeface="Arial"/>
+        <a:font script="Uigh" typeface="Microsoft Uighur"/>
+        <a:font script="Geor" typeface="Sylfaen"/>
+      </a:minorFont>
+    </a:fontScheme>
+    <a:fmtScheme name="Office">
+      <a:fillStyleLst>
+        <a:solidFill>
+          <a:schemeClr val="phClr"/>
+        </a:solidFill>
+        <a:gradFill rotWithShape="1">
+          <a:gsLst>
+            <a:gs pos="0">
+              <a:schemeClr val="phClr">
+                <a:tint val="50000"/>
+                <a:satMod val="300000"/>
+              </a:schemeClr>
+            </a:gs>
+            <a:gs pos="35000">
+              <a:schemeClr val="phClr">
+                <a:tint val="37000"/>
+                <a:satMod val="300000"/>
+              </a:schemeClr>
+            </a:gs>
+            <a:gs pos="100000">
+              <a:schemeClr val="phClr">
+                <a:tint val="15000"/>
+                <a:satMod val="350000"/>
+              </a:schemeClr>
+            </a:gs>
+          </a:gsLst>
+          <a:lin ang="16200000" scaled="1"/>
+        </a:gradFill>
+        <a:gradFill rotWithShape="1">
+          <a:gsLst>
+            <a:gs pos="0">
+              <a:schemeClr val="phClr">
+                <a:tint val="100000"/>
+                <a:shade val="100000"/>
+                <a:satMod val="130000"/>
+              </a:schemeClr>
+            </a:gs>
+            <a:gs pos="100000">
+              <a:schemeClr val="phClr">
+                <a:tint val="50000"/>
+                <a:shade val="100000"/>
+                <a:satMod val="350000"/>
+              </a:schemeClr>
+            </a:gs>
+          </a:gsLst>
+          <a:lin ang="16200000" scaled="0"/>
+        </a:gradFill>
+      </a:fillStyleLst>
+      <a:lnStyleLst>
+        <a:ln w="9525" cap="flat" cmpd="sng" algn="ctr">
+          <a:solidFill>
+            <a:schemeClr val="phClr">
+              <a:shade val="95000"/>
+              <a:satMod val="105000"/>
+            </a:schemeClr>
+          </a:solidFill>
+          <a:prstDash val="solid"/>
+        </a:ln>
+        <a:ln w="25400" cap="flat" cmpd="sng" algn="ctr">
+          <a:solidFill>
+            <a:schemeClr val="phClr"/>
+          </a:solidFill>
+          <a:prstDash val="solid"/>
+        </a:ln>
+        <a:ln w="38100" cap="flat" cmpd="sng" algn="ctr">
+          <a:solidFill>
+            <a:schemeClr val="phClr"/>
+          </a:solidFill>
+          <a:prstDash val="solid"/>
+        </a:ln>
+      </a:lnStyleLst>
+      <a:effectStyleLst>
+        <a:effectStyle>
+          <a:effectLst>
+            <a:outerShdw blurRad="40000" dist="20000" dir="5400000" rotWithShape="0">
+              <a:srgbClr val="000000">
+                <a:alpha val="38000"/>
+              </a:srgbClr>
+            </a:outerShdw>
+          </a:effectLst>
+        </a:effectStyle>
+        <a:effectStyle>
+          <a:effectLst>
+            <a:outerShdw blurRad="40000" dist="23000" dir="5400000" rotWithShape="0">
+              <a:srgbClr val="000000">
+                <a:alpha val="35000"/>
+              </a:srgbClr>
+            </a:outerShdw>
+          </a:effectLst>
+        </a:effectStyle>
+        <a:effectStyle>
+          <a:effectLst>
+            <a:outerShdw blurRad="40000" dist="23000" dir="5400000" rotWithShape="0">
+              <a:srgbClr val="000000">
+                <a:alpha val="35000"/>
+              </a:srgbClr>
+            </a:outerShdw>
+          </a:effectLst>
+          <a:scene3d>
+            <a:camera prst="orthographicFront">
+              <a:rot lat="0" lon="0" rev="0"/>
+            </a:camera>
+            <a:lightRig rig="threePt" dir="t">
+              <a:rot lat="0" lon="0" rev="1200000"/>
+            </a:lightRig>
+          </a:scene3d>
+          <a:sp3d>
+            <a:bevelT w="63500" h="25400"/>
+          </a:sp3d>
+        </a:effectStyle>
+      </a:effectStyleLst>
+      <a:bgFillStyleLst>
+        <a:solidFill>
+          <a:schemeClr val="phClr"/>
+        </a:solidFill>
+        <a:gradFill rotWithShape="1">
+          <a:gsLst>
+            <a:gs pos="0">
+              <a:schemeClr val="phClr">
+                <a:tint val="40000"/>
+                <a:satMod val="350000"/>
+              </a:schemeClr>
+            </a:gs>
+            <a:gs pos="40000">
+              <a:schemeClr val="phClr">
+                <a:tint val="45000"/>
+                <a:shade val="99000"/>
+                <a:satMod val="350000"/>
+              </a:schemeClr>
+            </a:gs>
+            <a:gs pos="100000">
+              <a:schemeClr val="phClr">
+                <a:shade val="20000"/>
+                <a:satMod val="255000"/>
+              </a:schemeClr>
+            </a:gs>
+          </a:gsLst>
+          <a:path path="circle">
+            <a:fillToRect l="50000" t="-80000" r="50000" b="180000"/>
+          </a:path>
+        </a:gradFill>
+        <a:gradFill rotWithShape="1">
+          <a:gsLst>
+            <a:gs pos="0">
+              <a:schemeClr val="phClr">
+                <a:tint val="80000"/>
+                <a:satMod val="300000"/>
+              </a:schemeClr>
+            </a:gs>
+            <a:gs pos="100000">
+              <a:schemeClr val="phClr">
+                <a:shade val="30000"/>
+                <a:satMod val="200000"/>
+              </a:schemeClr>
+            </a:gs>
+          </a:gsLst>
+          <a:path path="circle">
+            <a:fillToRect l="50000" t="50000" r="50000" b="50000"/>
+          </a:path>
+        </a:gradFill>
+      </a:bgFillStyleLst>
+    </a:fmtScheme>
+  </a:themeElements>
+</a:theme>
+</file>
+
+<file path=ppt/theme/theme2.xml><?xml version="1.0" encoding="utf-8"?>
 <a:theme xmlns:a="http://schemas.openxmlformats.org/drawingml/2006/main" xmlns:r="http://schemas.openxmlformats.org/officeDocument/2006/relationships" name="Streamline">
   <a:themeElements>
     <a:clrScheme name="Streamline">
@@ -32004,283 +32760,4 @@
     </a:fmtScheme>
   </a:themeElements>
 </a:theme>
-</file>
-
-<file path=ppt/theme/theme2.xml><?xml version="1.0" encoding="utf-8"?>
-<a:theme xmlns:a="http://schemas.openxmlformats.org/drawingml/2006/main" xmlns:r="http://schemas.openxmlformats.org/officeDocument/2006/relationships">
-  <a:themeElements>
-    <a:clrScheme name="Default">
-      <a:dk1>
-        <a:srgbClr val="000000"/>
-      </a:dk1>
-      <a:lt1>
-        <a:srgbClr val="FFFFFF"/>
-      </a:lt1>
-      <a:dk2>
-        <a:srgbClr val="158158"/>
-      </a:dk2>
-      <a:lt2>
-        <a:srgbClr val="F3F3F3"/>
-      </a:lt2>
-      <a:accent1>
-        <a:srgbClr val="058DC7"/>
-      </a:accent1>
-      <a:accent2>
-        <a:srgbClr val="50B432"/>
-      </a:accent2>
-      <a:accent3>
-        <a:srgbClr val="ED561B"/>
-      </a:accent3>
-      <a:accent4>
-        <a:srgbClr val="EDEF00"/>
-      </a:accent4>
-      <a:accent5>
-        <a:srgbClr val="24CBE5"/>
-      </a:accent5>
-      <a:accent6>
-        <a:srgbClr val="64E572"/>
-      </a:accent6>
-      <a:hlink>
-        <a:srgbClr val="2200CC"/>
-      </a:hlink>
-      <a:folHlink>
-        <a:srgbClr val="551A8B"/>
-      </a:folHlink>
-    </a:clrScheme>
-    <a:fontScheme name="Office">
-      <a:majorFont>
-        <a:latin typeface="Arial"/>
-        <a:ea typeface=""/>
-        <a:cs typeface=""/>
-        <a:font script="Jpan" typeface="ＭＳ Ｐゴシック"/>
-        <a:font script="Hang" typeface="맑은 고딕"/>
-        <a:font script="Hans" typeface="宋体"/>
-        <a:font script="Hant" typeface="新細明體"/>
-        <a:font script="Arab" typeface="Times New Roman"/>
-        <a:font script="Hebr" typeface="Times New Roman"/>
-        <a:font script="Thai" typeface="Angsana New"/>
-        <a:font script="Ethi" typeface="Nyala"/>
-        <a:font script="Beng" typeface="Vrinda"/>
-        <a:font script="Gujr" typeface="Shruti"/>
-        <a:font script="Khmr" typeface="MoolBoran"/>
-        <a:font script="Knda" typeface="Tunga"/>
-        <a:font script="Guru" typeface="Raavi"/>
-        <a:font script="Cans" typeface="Euphemia"/>
-        <a:font script="Cher" typeface="Plantagenet Cherokee"/>
-        <a:font script="Yiii" typeface="Microsoft Yi Baiti"/>
-        <a:font script="Tibt" typeface="Microsoft Himalaya"/>
-        <a:font script="Thaa" typeface="MV Boli"/>
-        <a:font script="Deva" typeface="Mangal"/>
-        <a:font script="Telu" typeface="Gautami"/>
-        <a:font script="Taml" typeface="Latha"/>
-        <a:font script="Syrc" typeface="Estrangelo Edessa"/>
-        <a:font script="Orya" typeface="Kalinga"/>
-        <a:font script="Mlym" typeface="Kartika"/>
-        <a:font script="Laoo" typeface="DokChampa"/>
-        <a:font script="Sinh" typeface="Iskoola Pota"/>
-        <a:font script="Mong" typeface="Mongolian Baiti"/>
-        <a:font script="Viet" typeface="Times New Roman"/>
-        <a:font script="Uigh" typeface="Microsoft Uighur"/>
-        <a:font script="Geor" typeface="Sylfaen"/>
-      </a:majorFont>
-      <a:minorFont>
-        <a:latin typeface="Arial"/>
-        <a:ea typeface=""/>
-        <a:cs typeface=""/>
-        <a:font script="Jpan" typeface="ＭＳ Ｐゴシック"/>
-        <a:font script="Hang" typeface="맑은 고딕"/>
-        <a:font script="Hans" typeface="宋体"/>
-        <a:font script="Hant" typeface="新細明體"/>
-        <a:font script="Arab" typeface="Arial"/>
-        <a:font script="Hebr" typeface="Arial"/>
-        <a:font script="Thai" typeface="Cordia New"/>
-        <a:font script="Ethi" typeface="Nyala"/>
-        <a:font script="Beng" typeface="Vrinda"/>
-        <a:font script="Gujr" typeface="Shruti"/>
-        <a:font script="Khmr" typeface="DaunPenh"/>
-        <a:font script="Knda" typeface="Tunga"/>
-        <a:font script="Guru" typeface="Raavi"/>
-        <a:font script="Cans" typeface="Euphemia"/>
-        <a:font script="Cher" typeface="Plantagenet Cherokee"/>
-        <a:font script="Yiii" typeface="Microsoft Yi Baiti"/>
-        <a:font script="Tibt" typeface="Microsoft Himalaya"/>
-        <a:font script="Thaa" typeface="MV Boli"/>
-        <a:font script="Deva" typeface="Mangal"/>
-        <a:font script="Telu" typeface="Gautami"/>
-        <a:font script="Taml" typeface="Latha"/>
-        <a:font script="Syrc" typeface="Estrangelo Edessa"/>
-        <a:font script="Orya" typeface="Kalinga"/>
-        <a:font script="Mlym" typeface="Kartika"/>
-        <a:font script="Laoo" typeface="DokChampa"/>
-        <a:font script="Sinh" typeface="Iskoola Pota"/>
-        <a:font script="Mong" typeface="Mongolian Baiti"/>
-        <a:font script="Viet" typeface="Arial"/>
-        <a:font script="Uigh" typeface="Microsoft Uighur"/>
-        <a:font script="Geor" typeface="Sylfaen"/>
-      </a:minorFont>
-    </a:fontScheme>
-    <a:fmtScheme name="Office">
-      <a:fillStyleLst>
-        <a:solidFill>
-          <a:schemeClr val="phClr"/>
-        </a:solidFill>
-        <a:gradFill rotWithShape="1">
-          <a:gsLst>
-            <a:gs pos="0">
-              <a:schemeClr val="phClr">
-                <a:tint val="50000"/>
-                <a:satMod val="300000"/>
-              </a:schemeClr>
-            </a:gs>
-            <a:gs pos="35000">
-              <a:schemeClr val="phClr">
-                <a:tint val="37000"/>
-                <a:satMod val="300000"/>
-              </a:schemeClr>
-            </a:gs>
-            <a:gs pos="100000">
-              <a:schemeClr val="phClr">
-                <a:tint val="15000"/>
-                <a:satMod val="350000"/>
-              </a:schemeClr>
-            </a:gs>
-          </a:gsLst>
-          <a:lin ang="16200000" scaled="1"/>
-        </a:gradFill>
-        <a:gradFill rotWithShape="1">
-          <a:gsLst>
-            <a:gs pos="0">
-              <a:schemeClr val="phClr">
-                <a:tint val="100000"/>
-                <a:shade val="100000"/>
-                <a:satMod val="130000"/>
-              </a:schemeClr>
-            </a:gs>
-            <a:gs pos="100000">
-              <a:schemeClr val="phClr">
-                <a:tint val="50000"/>
-                <a:shade val="100000"/>
-                <a:satMod val="350000"/>
-              </a:schemeClr>
-            </a:gs>
-          </a:gsLst>
-          <a:lin ang="16200000" scaled="0"/>
-        </a:gradFill>
-      </a:fillStyleLst>
-      <a:lnStyleLst>
-        <a:ln w="9525" cap="flat" cmpd="sng" algn="ctr">
-          <a:solidFill>
-            <a:schemeClr val="phClr">
-              <a:shade val="95000"/>
-              <a:satMod val="105000"/>
-            </a:schemeClr>
-          </a:solidFill>
-          <a:prstDash val="solid"/>
-        </a:ln>
-        <a:ln w="25400" cap="flat" cmpd="sng" algn="ctr">
-          <a:solidFill>
-            <a:schemeClr val="phClr"/>
-          </a:solidFill>
-          <a:prstDash val="solid"/>
-        </a:ln>
-        <a:ln w="38100" cap="flat" cmpd="sng" algn="ctr">
-          <a:solidFill>
-            <a:schemeClr val="phClr"/>
-          </a:solidFill>
-          <a:prstDash val="solid"/>
-        </a:ln>
-      </a:lnStyleLst>
-      <a:effectStyleLst>
-        <a:effectStyle>
-          <a:effectLst>
-            <a:outerShdw blurRad="40000" dist="20000" dir="5400000" rotWithShape="0">
-              <a:srgbClr val="000000">
-                <a:alpha val="38000"/>
-              </a:srgbClr>
-            </a:outerShdw>
-          </a:effectLst>
-        </a:effectStyle>
-        <a:effectStyle>
-          <a:effectLst>
-            <a:outerShdw blurRad="40000" dist="23000" dir="5400000" rotWithShape="0">
-              <a:srgbClr val="000000">
-                <a:alpha val="35000"/>
-              </a:srgbClr>
-            </a:outerShdw>
-          </a:effectLst>
-        </a:effectStyle>
-        <a:effectStyle>
-          <a:effectLst>
-            <a:outerShdw blurRad="40000" dist="23000" dir="5400000" rotWithShape="0">
-              <a:srgbClr val="000000">
-                <a:alpha val="35000"/>
-              </a:srgbClr>
-            </a:outerShdw>
-          </a:effectLst>
-          <a:scene3d>
-            <a:camera prst="orthographicFront">
-              <a:rot lat="0" lon="0" rev="0"/>
-            </a:camera>
-            <a:lightRig rig="threePt" dir="t">
-              <a:rot lat="0" lon="0" rev="1200000"/>
-            </a:lightRig>
-          </a:scene3d>
-          <a:sp3d>
-            <a:bevelT w="63500" h="25400"/>
-          </a:sp3d>
-        </a:effectStyle>
-      </a:effectStyleLst>
-      <a:bgFillStyleLst>
-        <a:solidFill>
-          <a:schemeClr val="phClr"/>
-        </a:solidFill>
-        <a:gradFill rotWithShape="1">
-          <a:gsLst>
-            <a:gs pos="0">
-              <a:schemeClr val="phClr">
-                <a:tint val="40000"/>
-                <a:satMod val="350000"/>
-              </a:schemeClr>
-            </a:gs>
-            <a:gs pos="40000">
-              <a:schemeClr val="phClr">
-                <a:tint val="45000"/>
-                <a:shade val="99000"/>
-                <a:satMod val="350000"/>
-              </a:schemeClr>
-            </a:gs>
-            <a:gs pos="100000">
-              <a:schemeClr val="phClr">
-                <a:shade val="20000"/>
-                <a:satMod val="255000"/>
-              </a:schemeClr>
-            </a:gs>
-          </a:gsLst>
-          <a:path path="circle">
-            <a:fillToRect l="50000" t="-80000" r="50000" b="180000"/>
-          </a:path>
-        </a:gradFill>
-        <a:gradFill rotWithShape="1">
-          <a:gsLst>
-            <a:gs pos="0">
-              <a:schemeClr val="phClr">
-                <a:tint val="80000"/>
-                <a:satMod val="300000"/>
-              </a:schemeClr>
-            </a:gs>
-            <a:gs pos="100000">
-              <a:schemeClr val="phClr">
-                <a:shade val="30000"/>
-                <a:satMod val="200000"/>
-              </a:schemeClr>
-            </a:gs>
-          </a:gsLst>
-          <a:path path="circle">
-            <a:fillToRect l="50000" t="50000" r="50000" b="50000"/>
-          </a:path>
-        </a:gradFill>
-      </a:bgFillStyleLst>
-    </a:fmtScheme>
-  </a:themeElements>
-</a:theme>
 </file>
</xml_diff>